<commit_message>
final update to powerpoint for tonight
</commit_message>
<xml_diff>
--- a/Modeling growth in SS.pptx
+++ b/Modeling growth in SS.pptx
@@ -5,7 +5,7 @@
     <p:sldMasterId id="2147483648" r:id="rId1"/>
   </p:sldMasterIdLst>
   <p:notesMasterIdLst>
-    <p:notesMasterId r:id="rId37"/>
+    <p:notesMasterId r:id="rId40"/>
   </p:notesMasterIdLst>
   <p:sldIdLst>
     <p:sldId id="256" r:id="rId2"/>
@@ -15,14 +15,14 @@
     <p:sldId id="258" r:id="rId6"/>
     <p:sldId id="259" r:id="rId7"/>
     <p:sldId id="264" r:id="rId8"/>
-    <p:sldId id="266" r:id="rId9"/>
-    <p:sldId id="265" r:id="rId10"/>
-    <p:sldId id="275" r:id="rId11"/>
-    <p:sldId id="262" r:id="rId12"/>
-    <p:sldId id="261" r:id="rId13"/>
-    <p:sldId id="263" r:id="rId14"/>
-    <p:sldId id="274" r:id="rId15"/>
-    <p:sldId id="276" r:id="rId16"/>
+    <p:sldId id="265" r:id="rId9"/>
+    <p:sldId id="275" r:id="rId10"/>
+    <p:sldId id="262" r:id="rId11"/>
+    <p:sldId id="261" r:id="rId12"/>
+    <p:sldId id="263" r:id="rId13"/>
+    <p:sldId id="274" r:id="rId14"/>
+    <p:sldId id="276" r:id="rId15"/>
+    <p:sldId id="305" r:id="rId16"/>
     <p:sldId id="267" r:id="rId17"/>
     <p:sldId id="277" r:id="rId18"/>
     <p:sldId id="278" r:id="rId19"/>
@@ -43,6 +43,9 @@
     <p:sldId id="299" r:id="rId34"/>
     <p:sldId id="300" r:id="rId35"/>
     <p:sldId id="283" r:id="rId36"/>
+    <p:sldId id="303" r:id="rId37"/>
+    <p:sldId id="302" r:id="rId38"/>
+    <p:sldId id="304" r:id="rId39"/>
   </p:sldIdLst>
   <p:sldSz cx="9144000" cy="6858000" type="screen4x3"/>
   <p:notesSz cx="6858000" cy="9144000"/>
@@ -3629,6 +3632,13 @@
   <p:clrMapOvr>
     <a:masterClrMapping/>
   </p:clrMapOvr>
+  <p:timing>
+    <p:tnLst>
+      <p:par>
+        <p:cTn id="1" dur="indefinite" restart="never" nodeType="tmRoot"/>
+      </p:par>
+    </p:tnLst>
+  </p:timing>
 </p:sld>
 </file>
 
@@ -3674,88 +3684,13 @@
         <p:spPr>
           <a:xfrm>
             <a:off x="800100" y="1803400"/>
-            <a:ext cx="7543800" cy="5029200"/>
+            <a:ext cx="7543800" cy="5029199"/>
           </a:xfrm>
         </p:spPr>
       </p:pic>
       <p:sp>
         <p:nvSpPr>
-          <p:cNvPr id="5" name="Slide Number Placeholder 4"/>
-          <p:cNvSpPr>
-            <a:spLocks noGrp="1"/>
-          </p:cNvSpPr>
-          <p:nvPr>
-            <p:ph type="sldNum" sz="quarter" idx="12"/>
-          </p:nvPr>
-        </p:nvSpPr>
-        <p:spPr/>
-        <p:txBody>
-          <a:bodyPr/>
-          <a:lstStyle/>
-          <a:p>
-            <a:fld id="{3317FC69-9C55-40B2-912C-F83C681DAE11}" type="slidenum">
-              <a:rPr lang="en-US" smtClean="0"/>
-              <a:t>10</a:t>
-            </a:fld>
-            <a:endParaRPr lang="en-US"/>
-          </a:p>
-        </p:txBody>
-      </p:sp>
-      <p:sp>
-        <p:nvSpPr>
-          <p:cNvPr id="8" name="TextBox 7"/>
-          <p:cNvSpPr txBox="1"/>
-          <p:nvPr/>
-        </p:nvSpPr>
-        <p:spPr>
-          <a:xfrm>
-            <a:off x="66965" y="6477000"/>
-            <a:ext cx="5190835" cy="307777"/>
-          </a:xfrm>
-          <a:prstGeom prst="rect">
-            <a:avLst/>
-          </a:prstGeom>
-          <a:noFill/>
-        </p:spPr>
-        <p:txBody>
-          <a:bodyPr wrap="square" rtlCol="0">
-            <a:spAutoFit/>
-          </a:bodyPr>
-          <a:lstStyle/>
-          <a:p>
-            <a:r>
-              <a:rPr lang="en-US" sz="1400" dirty="0">
-                <a:solidFill>
-                  <a:schemeClr val="accent1">
-                    <a:lumMod val="75000"/>
-                  </a:schemeClr>
-                </a:solidFill>
-              </a:rPr>
-              <a:t>s</a:t>
-            </a:r>
-            <a:r>
-              <a:rPr lang="en-US" sz="1400" dirty="0" smtClean="0">
-                <a:solidFill>
-                  <a:schemeClr val="accent1">
-                    <a:lumMod val="75000"/>
-                  </a:schemeClr>
-                </a:solidFill>
-              </a:rPr>
-              <a:t>ource model: growth_illustration_offset2</a:t>
-            </a:r>
-            <a:endParaRPr lang="en-US" sz="1400" dirty="0">
-              <a:solidFill>
-                <a:schemeClr val="accent1">
-                  <a:lumMod val="75000"/>
-                </a:schemeClr>
-              </a:solidFill>
-            </a:endParaRPr>
-          </a:p>
-        </p:txBody>
-      </p:sp>
-      <p:sp>
-        <p:nvSpPr>
-          <p:cNvPr id="9" name="Content Placeholder 2"/>
+          <p:cNvPr id="7" name="Content Placeholder 2"/>
           <p:cNvSpPr txBox="1">
             <a:spLocks/>
           </p:cNvSpPr>
@@ -3914,7 +3849,7 @@
           <a:p>
             <a:r>
               <a:rPr lang="en-US" sz="2400" dirty="0" smtClean="0"/>
-              <a:t>CV options for variability:</a:t>
+              <a:t>Offset options for variability:</a:t>
             </a:r>
           </a:p>
           <a:p>
@@ -3926,35 +3861,21 @@
                 <a:latin typeface="Courier New" panose="02070309020205020404" pitchFamily="49" charset="0"/>
                 <a:cs typeface="Courier New" panose="02070309020205020404" pitchFamily="49" charset="0"/>
               </a:rPr>
-              <a:t>1 #_</a:t>
+              <a:t>#_</a:t>
             </a:r>
             <a:r>
               <a:rPr lang="en-US" sz="2000" dirty="0" err="1" smtClean="0">
                 <a:latin typeface="Courier New" panose="02070309020205020404" pitchFamily="49" charset="0"/>
                 <a:cs typeface="Courier New" panose="02070309020205020404" pitchFamily="49" charset="0"/>
               </a:rPr>
-              <a:t>CV_Growth_Pattern</a:t>
+              <a:t>parameter_offset_approach</a:t>
             </a:r>
             <a:r>
               <a:rPr lang="en-US" sz="2000" dirty="0" smtClean="0">
                 <a:latin typeface="Courier New" panose="02070309020205020404" pitchFamily="49" charset="0"/>
                 <a:cs typeface="Courier New" panose="02070309020205020404" pitchFamily="49" charset="0"/>
               </a:rPr>
-              <a:t>:  0 CV=f(LAA); 1 CV=F(A); 2 SD=F(LAA); 3 SD=F(A); 4 </a:t>
-            </a:r>
-            <a:r>
-              <a:rPr lang="en-US" sz="2000" dirty="0" err="1" smtClean="0">
-                <a:latin typeface="Courier New" panose="02070309020205020404" pitchFamily="49" charset="0"/>
-                <a:cs typeface="Courier New" panose="02070309020205020404" pitchFamily="49" charset="0"/>
-              </a:rPr>
-              <a:t>logSD</a:t>
-            </a:r>
-            <a:r>
-              <a:rPr lang="en-US" sz="2000" dirty="0" smtClean="0">
-                <a:latin typeface="Courier New" panose="02070309020205020404" pitchFamily="49" charset="0"/>
-                <a:cs typeface="Courier New" panose="02070309020205020404" pitchFamily="49" charset="0"/>
-              </a:rPr>
-              <a:t>=F(A)</a:t>
+              <a:t> (1=none, 2= M, G, CV_G as offset from female-GP1, 3=like SS2 V1.x)</a:t>
             </a:r>
             <a:endParaRPr lang="en-US" sz="2400" dirty="0" smtClean="0">
               <a:latin typeface="Courier New" panose="02070309020205020404" pitchFamily="49" charset="0"/>
@@ -3963,52 +3884,39 @@
           </a:p>
         </p:txBody>
       </p:sp>
-      <p:cxnSp>
-        <p:nvCxnSpPr>
-          <p:cNvPr id="6" name="Straight Arrow Connector 5"/>
-          <p:cNvCxnSpPr/>
-          <p:nvPr/>
-        </p:nvCxnSpPr>
-        <p:spPr>
-          <a:xfrm flipV="1">
-            <a:off x="838200" y="2438400"/>
-            <a:ext cx="0" cy="3429000"/>
-          </a:xfrm>
-          <a:prstGeom prst="straightConnector1">
-            <a:avLst/>
-          </a:prstGeom>
-          <a:ln w="38100">
-            <a:solidFill>
-              <a:srgbClr val="C00000"/>
-            </a:solidFill>
-            <a:tailEnd type="arrow"/>
-          </a:ln>
-        </p:spPr>
-        <p:style>
-          <a:lnRef idx="1">
-            <a:schemeClr val="accent1"/>
-          </a:lnRef>
-          <a:fillRef idx="0">
-            <a:schemeClr val="accent1"/>
-          </a:fillRef>
-          <a:effectRef idx="0">
-            <a:schemeClr val="accent1"/>
-          </a:effectRef>
-          <a:fontRef idx="minor">
-            <a:schemeClr val="tx1"/>
-          </a:fontRef>
-        </p:style>
-      </p:cxnSp>
-      <p:sp>
-        <p:nvSpPr>
-          <p:cNvPr id="10" name="TextBox 9"/>
+      <p:sp>
+        <p:nvSpPr>
+          <p:cNvPr id="5" name="Slide Number Placeholder 4"/>
+          <p:cNvSpPr>
+            <a:spLocks noGrp="1"/>
+          </p:cNvSpPr>
+          <p:nvPr>
+            <p:ph type="sldNum" sz="quarter" idx="12"/>
+          </p:nvPr>
+        </p:nvSpPr>
+        <p:spPr/>
+        <p:txBody>
+          <a:bodyPr/>
+          <a:lstStyle/>
+          <a:p>
+            <a:fld id="{3317FC69-9C55-40B2-912C-F83C681DAE11}" type="slidenum">
+              <a:rPr lang="en-US" smtClean="0"/>
+              <a:t>10</a:t>
+            </a:fld>
+            <a:endParaRPr lang="en-US"/>
+          </a:p>
+        </p:txBody>
+      </p:sp>
+      <p:sp>
+        <p:nvSpPr>
+          <p:cNvPr id="8" name="TextBox 7"/>
           <p:cNvSpPr txBox="1"/>
           <p:nvPr/>
         </p:nvSpPr>
         <p:spPr>
-          <a:xfrm rot="16200000">
-            <a:off x="-719668" y="3968234"/>
-            <a:ext cx="2702022" cy="369332"/>
+          <a:xfrm>
+            <a:off x="66965" y="6477000"/>
+            <a:ext cx="5190835" cy="307777"/>
           </a:xfrm>
           <a:prstGeom prst="rect">
             <a:avLst/>
@@ -4016,104 +3924,44 @@
           <a:noFill/>
         </p:spPr>
         <p:txBody>
-          <a:bodyPr wrap="none" rtlCol="0">
+          <a:bodyPr wrap="square" rtlCol="0">
             <a:spAutoFit/>
           </a:bodyPr>
           <a:lstStyle/>
           <a:p>
             <a:r>
-              <a:rPr lang="en-US" b="1" dirty="0" smtClean="0">
-                <a:solidFill>
-                  <a:srgbClr val="C00000"/>
-                </a:solidFill>
-              </a:rPr>
-              <a:t>Can be CV or SD of growth</a:t>
-            </a:r>
-            <a:endParaRPr lang="en-US" b="1" dirty="0">
+              <a:rPr lang="en-US" sz="1400" dirty="0">
+                <a:solidFill>
+                  <a:schemeClr val="accent1">
+                    <a:lumMod val="75000"/>
+                  </a:schemeClr>
+                </a:solidFill>
+              </a:rPr>
+              <a:t>s</a:t>
+            </a:r>
+            <a:r>
+              <a:rPr lang="en-US" sz="1400" dirty="0" smtClean="0">
+                <a:solidFill>
+                  <a:schemeClr val="accent1">
+                    <a:lumMod val="75000"/>
+                  </a:schemeClr>
+                </a:solidFill>
+              </a:rPr>
+              <a:t>ource model: growth_illustration_offset3</a:t>
+            </a:r>
+            <a:endParaRPr lang="en-US" sz="1400" dirty="0">
               <a:solidFill>
-                <a:srgbClr val="C00000"/>
+                <a:schemeClr val="accent1">
+                  <a:lumMod val="75000"/>
+                </a:schemeClr>
               </a:solidFill>
             </a:endParaRPr>
           </a:p>
         </p:txBody>
       </p:sp>
-      <p:cxnSp>
-        <p:nvCxnSpPr>
-          <p:cNvPr id="11" name="Straight Arrow Connector 10"/>
-          <p:cNvCxnSpPr/>
-          <p:nvPr/>
-        </p:nvCxnSpPr>
-        <p:spPr>
-          <a:xfrm>
-            <a:off x="1828800" y="6477000"/>
-            <a:ext cx="4953000" cy="0"/>
-          </a:xfrm>
-          <a:prstGeom prst="straightConnector1">
-            <a:avLst/>
-          </a:prstGeom>
-          <a:ln w="38100">
-            <a:solidFill>
-              <a:srgbClr val="C00000"/>
-            </a:solidFill>
-            <a:tailEnd type="arrow"/>
-          </a:ln>
-        </p:spPr>
-        <p:style>
-          <a:lnRef idx="1">
-            <a:schemeClr val="accent1"/>
-          </a:lnRef>
-          <a:fillRef idx="0">
-            <a:schemeClr val="accent1"/>
-          </a:fillRef>
-          <a:effectRef idx="0">
-            <a:schemeClr val="accent1"/>
-          </a:effectRef>
-          <a:fontRef idx="minor">
-            <a:schemeClr val="tx1"/>
-          </a:fontRef>
-        </p:style>
-      </p:cxnSp>
-      <p:sp>
-        <p:nvSpPr>
-          <p:cNvPr id="12" name="TextBox 11"/>
-          <p:cNvSpPr txBox="1"/>
-          <p:nvPr/>
-        </p:nvSpPr>
-        <p:spPr>
-          <a:xfrm>
-            <a:off x="2514600" y="6019800"/>
-            <a:ext cx="2140971" cy="369332"/>
-          </a:xfrm>
-          <a:prstGeom prst="rect">
-            <a:avLst/>
-          </a:prstGeom>
-          <a:noFill/>
-        </p:spPr>
-        <p:txBody>
-          <a:bodyPr wrap="none" rtlCol="0">
-            <a:spAutoFit/>
-          </a:bodyPr>
-          <a:lstStyle/>
-          <a:p>
-            <a:r>
-              <a:rPr lang="en-US" b="1" dirty="0" smtClean="0">
-                <a:solidFill>
-                  <a:srgbClr val="C00000"/>
-                </a:solidFill>
-              </a:rPr>
-              <a:t>Can be age or length</a:t>
-            </a:r>
-            <a:endParaRPr lang="en-US" b="1" dirty="0">
-              <a:solidFill>
-                <a:srgbClr val="C00000"/>
-              </a:solidFill>
-            </a:endParaRPr>
-          </a:p>
-        </p:txBody>
-      </p:sp>
-      <p:sp>
-        <p:nvSpPr>
-          <p:cNvPr id="15" name="Title 14"/>
+      <p:sp>
+        <p:nvSpPr>
+          <p:cNvPr id="6" name="Title 5"/>
           <p:cNvSpPr>
             <a:spLocks noGrp="1"/>
           </p:cNvSpPr>
@@ -4137,7 +3985,7 @@
     </p:spTree>
     <p:extLst>
       <p:ext uri="{BB962C8B-B14F-4D97-AF65-F5344CB8AC3E}">
-        <p14:creationId xmlns:p14="http://schemas.microsoft.com/office/powerpoint/2010/main" val="869017399"/>
+        <p14:creationId xmlns:p14="http://schemas.microsoft.com/office/powerpoint/2010/main" val="2535656455"/>
       </p:ext>
     </p:extLst>
   </p:cSld>
@@ -4196,13 +4044,88 @@
         <p:spPr>
           <a:xfrm>
             <a:off x="800100" y="1803400"/>
-            <a:ext cx="7543800" cy="5029199"/>
+            <a:ext cx="7543800" cy="5029200"/>
           </a:xfrm>
         </p:spPr>
       </p:pic>
       <p:sp>
         <p:nvSpPr>
-          <p:cNvPr id="7" name="Content Placeholder 2"/>
+          <p:cNvPr id="5" name="Slide Number Placeholder 4"/>
+          <p:cNvSpPr>
+            <a:spLocks noGrp="1"/>
+          </p:cNvSpPr>
+          <p:nvPr>
+            <p:ph type="sldNum" sz="quarter" idx="12"/>
+          </p:nvPr>
+        </p:nvSpPr>
+        <p:spPr/>
+        <p:txBody>
+          <a:bodyPr/>
+          <a:lstStyle/>
+          <a:p>
+            <a:fld id="{3317FC69-9C55-40B2-912C-F83C681DAE11}" type="slidenum">
+              <a:rPr lang="en-US" smtClean="0"/>
+              <a:t>11</a:t>
+            </a:fld>
+            <a:endParaRPr lang="en-US"/>
+          </a:p>
+        </p:txBody>
+      </p:sp>
+      <p:sp>
+        <p:nvSpPr>
+          <p:cNvPr id="8" name="TextBox 7"/>
+          <p:cNvSpPr txBox="1"/>
+          <p:nvPr/>
+        </p:nvSpPr>
+        <p:spPr>
+          <a:xfrm>
+            <a:off x="66965" y="6477000"/>
+            <a:ext cx="5190835" cy="307777"/>
+          </a:xfrm>
+          <a:prstGeom prst="rect">
+            <a:avLst/>
+          </a:prstGeom>
+          <a:noFill/>
+        </p:spPr>
+        <p:txBody>
+          <a:bodyPr wrap="square" rtlCol="0">
+            <a:spAutoFit/>
+          </a:bodyPr>
+          <a:lstStyle/>
+          <a:p>
+            <a:r>
+              <a:rPr lang="en-US" sz="1400" dirty="0">
+                <a:solidFill>
+                  <a:schemeClr val="accent1">
+                    <a:lumMod val="75000"/>
+                  </a:schemeClr>
+                </a:solidFill>
+              </a:rPr>
+              <a:t>s</a:t>
+            </a:r>
+            <a:r>
+              <a:rPr lang="en-US" sz="1400" dirty="0" smtClean="0">
+                <a:solidFill>
+                  <a:schemeClr val="accent1">
+                    <a:lumMod val="75000"/>
+                  </a:schemeClr>
+                </a:solidFill>
+              </a:rPr>
+              <a:t>ource model: growth_illustration_offset2</a:t>
+            </a:r>
+            <a:endParaRPr lang="en-US" sz="1400" dirty="0">
+              <a:solidFill>
+                <a:schemeClr val="accent1">
+                  <a:lumMod val="75000"/>
+                </a:schemeClr>
+              </a:solidFill>
+            </a:endParaRPr>
+          </a:p>
+        </p:txBody>
+      </p:sp>
+      <p:sp>
+        <p:nvSpPr>
+          <p:cNvPr id="9" name="Content Placeholder 2"/>
           <p:cNvSpPr txBox="1">
             <a:spLocks/>
           </p:cNvSpPr>
@@ -4398,82 +4321,7 @@
       </p:sp>
       <p:sp>
         <p:nvSpPr>
-          <p:cNvPr id="5" name="Slide Number Placeholder 4"/>
-          <p:cNvSpPr>
-            <a:spLocks noGrp="1"/>
-          </p:cNvSpPr>
-          <p:nvPr>
-            <p:ph type="sldNum" sz="quarter" idx="12"/>
-          </p:nvPr>
-        </p:nvSpPr>
-        <p:spPr/>
-        <p:txBody>
-          <a:bodyPr/>
-          <a:lstStyle/>
-          <a:p>
-            <a:fld id="{3317FC69-9C55-40B2-912C-F83C681DAE11}" type="slidenum">
-              <a:rPr lang="en-US" smtClean="0"/>
-              <a:t>11</a:t>
-            </a:fld>
-            <a:endParaRPr lang="en-US"/>
-          </a:p>
-        </p:txBody>
-      </p:sp>
-      <p:sp>
-        <p:nvSpPr>
-          <p:cNvPr id="8" name="TextBox 7"/>
-          <p:cNvSpPr txBox="1"/>
-          <p:nvPr/>
-        </p:nvSpPr>
-        <p:spPr>
-          <a:xfrm>
-            <a:off x="66965" y="6477000"/>
-            <a:ext cx="5190835" cy="307777"/>
-          </a:xfrm>
-          <a:prstGeom prst="rect">
-            <a:avLst/>
-          </a:prstGeom>
-          <a:noFill/>
-        </p:spPr>
-        <p:txBody>
-          <a:bodyPr wrap="square" rtlCol="0">
-            <a:spAutoFit/>
-          </a:bodyPr>
-          <a:lstStyle/>
-          <a:p>
-            <a:r>
-              <a:rPr lang="en-US" sz="1400" dirty="0">
-                <a:solidFill>
-                  <a:schemeClr val="accent1">
-                    <a:lumMod val="75000"/>
-                  </a:schemeClr>
-                </a:solidFill>
-              </a:rPr>
-              <a:t>s</a:t>
-            </a:r>
-            <a:r>
-              <a:rPr lang="en-US" sz="1400" dirty="0" smtClean="0">
-                <a:solidFill>
-                  <a:schemeClr val="accent1">
-                    <a:lumMod val="75000"/>
-                  </a:schemeClr>
-                </a:solidFill>
-              </a:rPr>
-              <a:t>ource model: growth_illustration_offset3</a:t>
-            </a:r>
-            <a:endParaRPr lang="en-US" sz="1400" dirty="0">
-              <a:solidFill>
-                <a:schemeClr val="accent1">
-                  <a:lumMod val="75000"/>
-                </a:schemeClr>
-              </a:solidFill>
-            </a:endParaRPr>
-          </a:p>
-        </p:txBody>
-      </p:sp>
-      <p:sp>
-        <p:nvSpPr>
-          <p:cNvPr id="6" name="Title 5"/>
+          <p:cNvPr id="10" name="Title 9"/>
           <p:cNvSpPr>
             <a:spLocks noGrp="1"/>
           </p:cNvSpPr>
@@ -4497,7 +4345,7 @@
     </p:spTree>
     <p:extLst>
       <p:ext uri="{BB962C8B-B14F-4D97-AF65-F5344CB8AC3E}">
-        <p14:creationId xmlns:p14="http://schemas.microsoft.com/office/powerpoint/2010/main" val="2535656455"/>
+        <p14:creationId xmlns:p14="http://schemas.microsoft.com/office/powerpoint/2010/main" val="1028487375"/>
       </p:ext>
     </p:extLst>
   </p:cSld>
@@ -4556,366 +4404,6 @@
         <p:spPr>
           <a:xfrm>
             <a:off x="800100" y="1803400"/>
-            <a:ext cx="7543800" cy="5029200"/>
-          </a:xfrm>
-        </p:spPr>
-      </p:pic>
-      <p:sp>
-        <p:nvSpPr>
-          <p:cNvPr id="5" name="Slide Number Placeholder 4"/>
-          <p:cNvSpPr>
-            <a:spLocks noGrp="1"/>
-          </p:cNvSpPr>
-          <p:nvPr>
-            <p:ph type="sldNum" sz="quarter" idx="12"/>
-          </p:nvPr>
-        </p:nvSpPr>
-        <p:spPr/>
-        <p:txBody>
-          <a:bodyPr/>
-          <a:lstStyle/>
-          <a:p>
-            <a:fld id="{3317FC69-9C55-40B2-912C-F83C681DAE11}" type="slidenum">
-              <a:rPr lang="en-US" smtClean="0"/>
-              <a:t>12</a:t>
-            </a:fld>
-            <a:endParaRPr lang="en-US"/>
-          </a:p>
-        </p:txBody>
-      </p:sp>
-      <p:sp>
-        <p:nvSpPr>
-          <p:cNvPr id="8" name="TextBox 7"/>
-          <p:cNvSpPr txBox="1"/>
-          <p:nvPr/>
-        </p:nvSpPr>
-        <p:spPr>
-          <a:xfrm>
-            <a:off x="66965" y="6477000"/>
-            <a:ext cx="5190835" cy="307777"/>
-          </a:xfrm>
-          <a:prstGeom prst="rect">
-            <a:avLst/>
-          </a:prstGeom>
-          <a:noFill/>
-        </p:spPr>
-        <p:txBody>
-          <a:bodyPr wrap="square" rtlCol="0">
-            <a:spAutoFit/>
-          </a:bodyPr>
-          <a:lstStyle/>
-          <a:p>
-            <a:r>
-              <a:rPr lang="en-US" sz="1400" dirty="0">
-                <a:solidFill>
-                  <a:schemeClr val="accent1">
-                    <a:lumMod val="75000"/>
-                  </a:schemeClr>
-                </a:solidFill>
-              </a:rPr>
-              <a:t>s</a:t>
-            </a:r>
-            <a:r>
-              <a:rPr lang="en-US" sz="1400" dirty="0" smtClean="0">
-                <a:solidFill>
-                  <a:schemeClr val="accent1">
-                    <a:lumMod val="75000"/>
-                  </a:schemeClr>
-                </a:solidFill>
-              </a:rPr>
-              <a:t>ource model: growth_illustration_offset2</a:t>
-            </a:r>
-            <a:endParaRPr lang="en-US" sz="1400" dirty="0">
-              <a:solidFill>
-                <a:schemeClr val="accent1">
-                  <a:lumMod val="75000"/>
-                </a:schemeClr>
-              </a:solidFill>
-            </a:endParaRPr>
-          </a:p>
-        </p:txBody>
-      </p:sp>
-      <p:sp>
-        <p:nvSpPr>
-          <p:cNvPr id="9" name="Content Placeholder 2"/>
-          <p:cNvSpPr txBox="1">
-            <a:spLocks/>
-          </p:cNvSpPr>
-          <p:nvPr/>
-        </p:nvSpPr>
-        <p:spPr>
-          <a:xfrm>
-            <a:off x="457200" y="762000"/>
-            <a:ext cx="8229600" cy="4525963"/>
-          </a:xfrm>
-          <a:prstGeom prst="rect">
-            <a:avLst/>
-          </a:prstGeom>
-        </p:spPr>
-        <p:txBody>
-          <a:bodyPr vert="horz" lIns="91440" tIns="45720" rIns="91440" bIns="45720" rtlCol="0">
-            <a:normAutofit/>
-          </a:bodyPr>
-          <a:lstStyle>
-            <a:lvl1pPr marL="342900" indent="-342900" algn="l" defTabSz="914400" rtl="0" eaLnBrk="1" latinLnBrk="0" hangingPunct="1">
-              <a:spcBef>
-                <a:spcPct val="20000"/>
-              </a:spcBef>
-              <a:buFont typeface="Arial" panose="020B0604020202020204" pitchFamily="34" charset="0"/>
-              <a:buChar char="•"/>
-              <a:defRPr sz="3200" kern="1200">
-                <a:solidFill>
-                  <a:schemeClr val="tx1"/>
-                </a:solidFill>
-                <a:latin typeface="+mn-lt"/>
-                <a:ea typeface="+mn-ea"/>
-                <a:cs typeface="+mn-cs"/>
-              </a:defRPr>
-            </a:lvl1pPr>
-            <a:lvl2pPr marL="742950" indent="-285750" algn="l" defTabSz="914400" rtl="0" eaLnBrk="1" latinLnBrk="0" hangingPunct="1">
-              <a:spcBef>
-                <a:spcPct val="20000"/>
-              </a:spcBef>
-              <a:buFont typeface="Arial" panose="020B0604020202020204" pitchFamily="34" charset="0"/>
-              <a:buChar char="–"/>
-              <a:defRPr sz="2800" kern="1200">
-                <a:solidFill>
-                  <a:schemeClr val="tx1"/>
-                </a:solidFill>
-                <a:latin typeface="+mn-lt"/>
-                <a:ea typeface="+mn-ea"/>
-                <a:cs typeface="+mn-cs"/>
-              </a:defRPr>
-            </a:lvl2pPr>
-            <a:lvl3pPr marL="1143000" indent="-228600" algn="l" defTabSz="914400" rtl="0" eaLnBrk="1" latinLnBrk="0" hangingPunct="1">
-              <a:spcBef>
-                <a:spcPct val="20000"/>
-              </a:spcBef>
-              <a:buFont typeface="Arial" panose="020B0604020202020204" pitchFamily="34" charset="0"/>
-              <a:buChar char="•"/>
-              <a:defRPr sz="2400" kern="1200">
-                <a:solidFill>
-                  <a:schemeClr val="tx1"/>
-                </a:solidFill>
-                <a:latin typeface="+mn-lt"/>
-                <a:ea typeface="+mn-ea"/>
-                <a:cs typeface="+mn-cs"/>
-              </a:defRPr>
-            </a:lvl3pPr>
-            <a:lvl4pPr marL="1600200" indent="-228600" algn="l" defTabSz="914400" rtl="0" eaLnBrk="1" latinLnBrk="0" hangingPunct="1">
-              <a:spcBef>
-                <a:spcPct val="20000"/>
-              </a:spcBef>
-              <a:buFont typeface="Arial" panose="020B0604020202020204" pitchFamily="34" charset="0"/>
-              <a:buChar char="–"/>
-              <a:defRPr sz="2000" kern="1200">
-                <a:solidFill>
-                  <a:schemeClr val="tx1"/>
-                </a:solidFill>
-                <a:latin typeface="+mn-lt"/>
-                <a:ea typeface="+mn-ea"/>
-                <a:cs typeface="+mn-cs"/>
-              </a:defRPr>
-            </a:lvl4pPr>
-            <a:lvl5pPr marL="2057400" indent="-228600" algn="l" defTabSz="914400" rtl="0" eaLnBrk="1" latinLnBrk="0" hangingPunct="1">
-              <a:spcBef>
-                <a:spcPct val="20000"/>
-              </a:spcBef>
-              <a:buFont typeface="Arial" panose="020B0604020202020204" pitchFamily="34" charset="0"/>
-              <a:buChar char="»"/>
-              <a:defRPr sz="2000" kern="1200">
-                <a:solidFill>
-                  <a:schemeClr val="tx1"/>
-                </a:solidFill>
-                <a:latin typeface="+mn-lt"/>
-                <a:ea typeface="+mn-ea"/>
-                <a:cs typeface="+mn-cs"/>
-              </a:defRPr>
-            </a:lvl5pPr>
-            <a:lvl6pPr marL="2514600" indent="-228600" algn="l" defTabSz="914400" rtl="0" eaLnBrk="1" latinLnBrk="0" hangingPunct="1">
-              <a:spcBef>
-                <a:spcPct val="20000"/>
-              </a:spcBef>
-              <a:buFont typeface="Arial" panose="020B0604020202020204" pitchFamily="34" charset="0"/>
-              <a:buChar char="•"/>
-              <a:defRPr sz="2000" kern="1200">
-                <a:solidFill>
-                  <a:schemeClr val="tx1"/>
-                </a:solidFill>
-                <a:latin typeface="+mn-lt"/>
-                <a:ea typeface="+mn-ea"/>
-                <a:cs typeface="+mn-cs"/>
-              </a:defRPr>
-            </a:lvl6pPr>
-            <a:lvl7pPr marL="2971800" indent="-228600" algn="l" defTabSz="914400" rtl="0" eaLnBrk="1" latinLnBrk="0" hangingPunct="1">
-              <a:spcBef>
-                <a:spcPct val="20000"/>
-              </a:spcBef>
-              <a:buFont typeface="Arial" panose="020B0604020202020204" pitchFamily="34" charset="0"/>
-              <a:buChar char="•"/>
-              <a:defRPr sz="2000" kern="1200">
-                <a:solidFill>
-                  <a:schemeClr val="tx1"/>
-                </a:solidFill>
-                <a:latin typeface="+mn-lt"/>
-                <a:ea typeface="+mn-ea"/>
-                <a:cs typeface="+mn-cs"/>
-              </a:defRPr>
-            </a:lvl7pPr>
-            <a:lvl8pPr marL="3429000" indent="-228600" algn="l" defTabSz="914400" rtl="0" eaLnBrk="1" latinLnBrk="0" hangingPunct="1">
-              <a:spcBef>
-                <a:spcPct val="20000"/>
-              </a:spcBef>
-              <a:buFont typeface="Arial" panose="020B0604020202020204" pitchFamily="34" charset="0"/>
-              <a:buChar char="•"/>
-              <a:defRPr sz="2000" kern="1200">
-                <a:solidFill>
-                  <a:schemeClr val="tx1"/>
-                </a:solidFill>
-                <a:latin typeface="+mn-lt"/>
-                <a:ea typeface="+mn-ea"/>
-                <a:cs typeface="+mn-cs"/>
-              </a:defRPr>
-            </a:lvl8pPr>
-            <a:lvl9pPr marL="3886200" indent="-228600" algn="l" defTabSz="914400" rtl="0" eaLnBrk="1" latinLnBrk="0" hangingPunct="1">
-              <a:spcBef>
-                <a:spcPct val="20000"/>
-              </a:spcBef>
-              <a:buFont typeface="Arial" panose="020B0604020202020204" pitchFamily="34" charset="0"/>
-              <a:buChar char="•"/>
-              <a:defRPr sz="2000" kern="1200">
-                <a:solidFill>
-                  <a:schemeClr val="tx1"/>
-                </a:solidFill>
-                <a:latin typeface="+mn-lt"/>
-                <a:ea typeface="+mn-ea"/>
-                <a:cs typeface="+mn-cs"/>
-              </a:defRPr>
-            </a:lvl9pPr>
-          </a:lstStyle>
-          <a:p>
-            <a:r>
-              <a:rPr lang="en-US" sz="2400" dirty="0" smtClean="0"/>
-              <a:t>Offset options for variability:</a:t>
-            </a:r>
-          </a:p>
-          <a:p>
-            <a:pPr marL="0" indent="0">
-              <a:buNone/>
-            </a:pPr>
-            <a:r>
-              <a:rPr lang="en-US" sz="2000" dirty="0" smtClean="0">
-                <a:latin typeface="Courier New" panose="02070309020205020404" pitchFamily="49" charset="0"/>
-                <a:cs typeface="Courier New" panose="02070309020205020404" pitchFamily="49" charset="0"/>
-              </a:rPr>
-              <a:t>#_</a:t>
-            </a:r>
-            <a:r>
-              <a:rPr lang="en-US" sz="2000" dirty="0" err="1" smtClean="0">
-                <a:latin typeface="Courier New" panose="02070309020205020404" pitchFamily="49" charset="0"/>
-                <a:cs typeface="Courier New" panose="02070309020205020404" pitchFamily="49" charset="0"/>
-              </a:rPr>
-              <a:t>parameter_offset_approach</a:t>
-            </a:r>
-            <a:r>
-              <a:rPr lang="en-US" sz="2000" dirty="0" smtClean="0">
-                <a:latin typeface="Courier New" panose="02070309020205020404" pitchFamily="49" charset="0"/>
-                <a:cs typeface="Courier New" panose="02070309020205020404" pitchFamily="49" charset="0"/>
-              </a:rPr>
-              <a:t> (1=none, 2= M, G, CV_G as offset from female-GP1, 3=like SS2 V1.x)</a:t>
-            </a:r>
-            <a:endParaRPr lang="en-US" sz="2400" dirty="0" smtClean="0">
-              <a:latin typeface="Courier New" panose="02070309020205020404" pitchFamily="49" charset="0"/>
-              <a:cs typeface="Courier New" panose="02070309020205020404" pitchFamily="49" charset="0"/>
-            </a:endParaRPr>
-          </a:p>
-        </p:txBody>
-      </p:sp>
-      <p:sp>
-        <p:nvSpPr>
-          <p:cNvPr id="10" name="Title 9"/>
-          <p:cNvSpPr>
-            <a:spLocks noGrp="1"/>
-          </p:cNvSpPr>
-          <p:nvPr>
-            <p:ph type="title"/>
-          </p:nvPr>
-        </p:nvSpPr>
-        <p:spPr/>
-        <p:txBody>
-          <a:bodyPr/>
-          <a:lstStyle/>
-          <a:p>
-            <a:r>
-              <a:rPr lang="en-US" dirty="0" smtClean="0"/>
-              <a:t>Parameterization of growth: length variability</a:t>
-            </a:r>
-            <a:endParaRPr lang="en-US" dirty="0"/>
-          </a:p>
-        </p:txBody>
-      </p:sp>
-    </p:spTree>
-    <p:extLst>
-      <p:ext uri="{BB962C8B-B14F-4D97-AF65-F5344CB8AC3E}">
-        <p14:creationId xmlns:p14="http://schemas.microsoft.com/office/powerpoint/2010/main" val="1028487375"/>
-      </p:ext>
-    </p:extLst>
-  </p:cSld>
-  <p:clrMapOvr>
-    <a:masterClrMapping/>
-  </p:clrMapOvr>
-  <p:timing>
-    <p:tnLst>
-      <p:par>
-        <p:cTn id="1" dur="indefinite" restart="never" nodeType="tmRoot"/>
-      </p:par>
-    </p:tnLst>
-  </p:timing>
-</p:sld>
-</file>
-
-<file path=ppt/slides/slide13.xml><?xml version="1.0" encoding="utf-8"?>
-<p:sld xmlns:a="http://schemas.openxmlformats.org/drawingml/2006/main" xmlns:r="http://schemas.openxmlformats.org/officeDocument/2006/relationships" xmlns:p="http://schemas.openxmlformats.org/presentationml/2006/main">
-  <p:cSld>
-    <p:spTree>
-      <p:nvGrpSpPr>
-        <p:cNvPr id="1" name=""/>
-        <p:cNvGrpSpPr/>
-        <p:nvPr/>
-      </p:nvGrpSpPr>
-      <p:grpSpPr>
-        <a:xfrm>
-          <a:off x="0" y="0"/>
-          <a:ext cx="0" cy="0"/>
-          <a:chOff x="0" y="0"/>
-          <a:chExt cx="0" cy="0"/>
-        </a:xfrm>
-      </p:grpSpPr>
-      <p:pic>
-        <p:nvPicPr>
-          <p:cNvPr id="4" name="Content Placeholder 3"/>
-          <p:cNvPicPr>
-            <a:picLocks noGrp="1" noChangeAspect="1"/>
-          </p:cNvPicPr>
-          <p:nvPr>
-            <p:ph idx="1"/>
-          </p:nvPr>
-        </p:nvPicPr>
-        <p:blipFill>
-          <a:blip r:embed="rId2">
-            <a:extLst>
-              <a:ext uri="{28A0092B-C50C-407E-A947-70E740481C1C}">
-                <a14:useLocalDpi xmlns:a14="http://schemas.microsoft.com/office/drawing/2010/main" val="0"/>
-              </a:ext>
-            </a:extLst>
-          </a:blip>
-          <a:stretch>
-            <a:fillRect/>
-          </a:stretch>
-        </p:blipFill>
-        <p:spPr>
-          <a:xfrm>
-            <a:off x="800100" y="1803400"/>
             <a:ext cx="7543800" cy="5029199"/>
           </a:xfrm>
         </p:spPr>
@@ -4937,7 +4425,7 @@
           <a:p>
             <a:fld id="{3317FC69-9C55-40B2-912C-F83C681DAE11}" type="slidenum">
               <a:rPr lang="en-US" smtClean="0"/>
-              <a:t>13</a:t>
+              <a:t>12</a:t>
             </a:fld>
             <a:endParaRPr lang="en-US"/>
           </a:p>
@@ -5234,7 +4722,7 @@
 </p:sld>
 </file>
 
-<file path=ppt/slides/slide14.xml><?xml version="1.0" encoding="utf-8"?>
+<file path=ppt/slides/slide13.xml><?xml version="1.0" encoding="utf-8"?>
 <p:sld xmlns:a="http://schemas.openxmlformats.org/drawingml/2006/main" xmlns:r="http://schemas.openxmlformats.org/officeDocument/2006/relationships" xmlns:p="http://schemas.openxmlformats.org/presentationml/2006/main">
   <p:cSld>
     <p:spTree>
@@ -5309,7 +4797,7 @@
           <a:p>
             <a:fld id="{3317FC69-9C55-40B2-912C-F83C681DAE11}" type="slidenum">
               <a:rPr lang="en-US" smtClean="0"/>
-              <a:t>14</a:t>
+              <a:t>13</a:t>
             </a:fld>
             <a:endParaRPr lang="en-US"/>
           </a:p>
@@ -5410,7 +4898,7 @@
 </p:sld>
 </file>
 
-<file path=ppt/slides/slide15.xml><?xml version="1.0" encoding="utf-8"?>
+<file path=ppt/slides/slide14.xml><?xml version="1.0" encoding="utf-8"?>
 <p:sld xmlns:a="http://schemas.openxmlformats.org/drawingml/2006/main" xmlns:r="http://schemas.openxmlformats.org/officeDocument/2006/relationships" xmlns:p="http://schemas.openxmlformats.org/presentationml/2006/main">
   <p:cSld>
     <p:spTree>
@@ -5484,7 +4972,7 @@
           <a:p>
             <a:fld id="{3317FC69-9C55-40B2-912C-F83C681DAE11}" type="slidenum">
               <a:rPr lang="en-US" smtClean="0"/>
-              <a:t>15</a:t>
+              <a:t>14</a:t>
             </a:fld>
             <a:endParaRPr lang="en-US"/>
           </a:p>
@@ -5569,6 +5057,554 @@
     <p:extLst>
       <p:ext uri="{BB962C8B-B14F-4D97-AF65-F5344CB8AC3E}">
         <p14:creationId xmlns:p14="http://schemas.microsoft.com/office/powerpoint/2010/main" val="290109474"/>
+      </p:ext>
+    </p:extLst>
+  </p:cSld>
+  <p:clrMapOvr>
+    <a:masterClrMapping/>
+  </p:clrMapOvr>
+  <p:timing>
+    <p:tnLst>
+      <p:par>
+        <p:cTn id="1" dur="indefinite" restart="never" nodeType="tmRoot"/>
+      </p:par>
+    </p:tnLst>
+  </p:timing>
+</p:sld>
+</file>
+
+<file path=ppt/slides/slide15.xml><?xml version="1.0" encoding="utf-8"?>
+<p:sld xmlns:a="http://schemas.openxmlformats.org/drawingml/2006/main" xmlns:r="http://schemas.openxmlformats.org/officeDocument/2006/relationships" xmlns:p="http://schemas.openxmlformats.org/presentationml/2006/main">
+  <p:cSld>
+    <p:spTree>
+      <p:nvGrpSpPr>
+        <p:cNvPr id="1" name=""/>
+        <p:cNvGrpSpPr/>
+        <p:nvPr/>
+      </p:nvGrpSpPr>
+      <p:grpSpPr>
+        <a:xfrm>
+          <a:off x="0" y="0"/>
+          <a:ext cx="0" cy="0"/>
+          <a:chOff x="0" y="0"/>
+          <a:chExt cx="0" cy="0"/>
+        </a:xfrm>
+      </p:grpSpPr>
+      <p:pic>
+        <p:nvPicPr>
+          <p:cNvPr id="17412" name="Picture 4" descr="C:\GitHub\SSgrowth\models\rockfish_conditional_ages\plots\bio1_sizeatage.png"/>
+          <p:cNvPicPr>
+            <a:picLocks noGrp="1" noChangeAspect="1" noChangeArrowheads="1"/>
+          </p:cNvPicPr>
+          <p:nvPr>
+            <p:ph idx="1"/>
+          </p:nvPr>
+        </p:nvPicPr>
+        <p:blipFill rotWithShape="1">
+          <a:blip r:embed="rId2" cstate="print">
+            <a:extLst>
+              <a:ext uri="{28A0092B-C50C-407E-A947-70E740481C1C}">
+                <a14:useLocalDpi xmlns:a14="http://schemas.microsoft.com/office/drawing/2010/main" val="0"/>
+              </a:ext>
+            </a:extLst>
+          </a:blip>
+          <a:srcRect t="28721" b="-1"/>
+          <a:stretch/>
+        </p:blipFill>
+        <p:spPr bwMode="auto">
+          <a:xfrm>
+            <a:off x="1828800" y="2752725"/>
+            <a:ext cx="7467600" cy="4562475"/>
+          </a:xfrm>
+          <a:prstGeom prst="rect">
+            <a:avLst/>
+          </a:prstGeom>
+          <a:noFill/>
+          <a:extLst>
+            <a:ext uri="{909E8E84-426E-40DD-AFC4-6F175D3DCCD1}">
+              <a14:hiddenFill xmlns:a14="http://schemas.microsoft.com/office/drawing/2010/main">
+                <a:solidFill>
+                  <a:srgbClr val="FFFFFF"/>
+                </a:solidFill>
+              </a14:hiddenFill>
+            </a:ext>
+          </a:extLst>
+        </p:spPr>
+      </p:pic>
+      <p:sp>
+        <p:nvSpPr>
+          <p:cNvPr id="2" name="Title 1"/>
+          <p:cNvSpPr>
+            <a:spLocks noGrp="1"/>
+          </p:cNvSpPr>
+          <p:nvPr>
+            <p:ph type="title"/>
+          </p:nvPr>
+        </p:nvSpPr>
+        <p:spPr/>
+        <p:txBody>
+          <a:bodyPr/>
+          <a:lstStyle/>
+          <a:p>
+            <a:r>
+              <a:rPr lang="en-US" dirty="0" smtClean="0"/>
+              <a:t>Parameterization of growth: uncertainty</a:t>
+            </a:r>
+            <a:endParaRPr lang="en-US" dirty="0"/>
+          </a:p>
+        </p:txBody>
+      </p:sp>
+      <p:sp>
+        <p:nvSpPr>
+          <p:cNvPr id="4" name="Slide Number Placeholder 3"/>
+          <p:cNvSpPr>
+            <a:spLocks noGrp="1"/>
+          </p:cNvSpPr>
+          <p:nvPr>
+            <p:ph type="sldNum" sz="quarter" idx="12"/>
+          </p:nvPr>
+        </p:nvSpPr>
+        <p:spPr/>
+        <p:txBody>
+          <a:bodyPr/>
+          <a:lstStyle/>
+          <a:p>
+            <a:fld id="{3317FC69-9C55-40B2-912C-F83C681DAE11}" type="slidenum">
+              <a:rPr lang="en-US" smtClean="0"/>
+              <a:t>15</a:t>
+            </a:fld>
+            <a:endParaRPr lang="en-US"/>
+          </a:p>
+        </p:txBody>
+      </p:sp>
+      <p:sp>
+        <p:nvSpPr>
+          <p:cNvPr id="10" name="TextBox 9"/>
+          <p:cNvSpPr txBox="1"/>
+          <p:nvPr/>
+        </p:nvSpPr>
+        <p:spPr>
+          <a:xfrm>
+            <a:off x="66965" y="6477000"/>
+            <a:ext cx="5190835" cy="307777"/>
+          </a:xfrm>
+          <a:prstGeom prst="rect">
+            <a:avLst/>
+          </a:prstGeom>
+          <a:noFill/>
+        </p:spPr>
+        <p:txBody>
+          <a:bodyPr wrap="square" rtlCol="0">
+            <a:spAutoFit/>
+          </a:bodyPr>
+          <a:lstStyle/>
+          <a:p>
+            <a:r>
+              <a:rPr lang="en-US" sz="1400" dirty="0">
+                <a:solidFill>
+                  <a:schemeClr val="accent1">
+                    <a:lumMod val="75000"/>
+                  </a:schemeClr>
+                </a:solidFill>
+              </a:rPr>
+              <a:t>s</a:t>
+            </a:r>
+            <a:r>
+              <a:rPr lang="en-US" sz="1400" dirty="0" smtClean="0">
+                <a:solidFill>
+                  <a:schemeClr val="accent1">
+                    <a:lumMod val="75000"/>
+                  </a:schemeClr>
+                </a:solidFill>
+              </a:rPr>
+              <a:t>ource model: </a:t>
+            </a:r>
+            <a:r>
+              <a:rPr lang="en-US" sz="1400" dirty="0" err="1" smtClean="0">
+                <a:solidFill>
+                  <a:schemeClr val="accent1">
+                    <a:lumMod val="75000"/>
+                  </a:schemeClr>
+                </a:solidFill>
+              </a:rPr>
+              <a:t>rockfish_conditional_ages</a:t>
+            </a:r>
+            <a:endParaRPr lang="en-US" sz="1400" dirty="0" smtClean="0">
+              <a:solidFill>
+                <a:schemeClr val="accent1">
+                  <a:lumMod val="75000"/>
+                </a:schemeClr>
+              </a:solidFill>
+            </a:endParaRPr>
+          </a:p>
+        </p:txBody>
+      </p:sp>
+      <p:sp>
+        <p:nvSpPr>
+          <p:cNvPr id="8" name="Rectangle 7"/>
+          <p:cNvSpPr/>
+          <p:nvPr/>
+        </p:nvSpPr>
+        <p:spPr>
+          <a:xfrm>
+            <a:off x="95540" y="685800"/>
+            <a:ext cx="9048460" cy="2062103"/>
+          </a:xfrm>
+          <a:prstGeom prst="rect">
+            <a:avLst/>
+          </a:prstGeom>
+        </p:spPr>
+        <p:txBody>
+          <a:bodyPr wrap="square">
+            <a:spAutoFit/>
+          </a:bodyPr>
+          <a:lstStyle/>
+          <a:p>
+            <a:r>
+              <a:rPr lang="en-US" sz="1600" dirty="0" smtClean="0">
+                <a:latin typeface="Courier New" panose="02070309020205020404" pitchFamily="49" charset="0"/>
+                <a:cs typeface="Courier New" panose="02070309020205020404" pitchFamily="49" charset="0"/>
+              </a:rPr>
+              <a:t>1          # (0/1) read specs for more </a:t>
+            </a:r>
+            <a:r>
+              <a:rPr lang="en-US" sz="1600" dirty="0" err="1" smtClean="0">
+                <a:latin typeface="Courier New" panose="02070309020205020404" pitchFamily="49" charset="0"/>
+                <a:cs typeface="Courier New" panose="02070309020205020404" pitchFamily="49" charset="0"/>
+              </a:rPr>
+              <a:t>stddev</a:t>
+            </a:r>
+            <a:r>
+              <a:rPr lang="en-US" sz="1600" dirty="0" smtClean="0">
+                <a:latin typeface="Courier New" panose="02070309020205020404" pitchFamily="49" charset="0"/>
+                <a:cs typeface="Courier New" panose="02070309020205020404" pitchFamily="49" charset="0"/>
+              </a:rPr>
+              <a:t> reporting </a:t>
+            </a:r>
+          </a:p>
+          <a:p>
+            <a:r>
+              <a:rPr lang="en-US" sz="1600" dirty="0" smtClean="0">
+                <a:latin typeface="Courier New" panose="02070309020205020404" pitchFamily="49" charset="0"/>
+                <a:cs typeface="Courier New" panose="02070309020205020404" pitchFamily="49" charset="0"/>
+              </a:rPr>
+              <a:t>1  1 -1  2 # </a:t>
+            </a:r>
+            <a:r>
+              <a:rPr lang="en-US" sz="1600" dirty="0" err="1" smtClean="0">
+                <a:latin typeface="Courier New" panose="02070309020205020404" pitchFamily="49" charset="0"/>
+                <a:cs typeface="Courier New" panose="02070309020205020404" pitchFamily="49" charset="0"/>
+              </a:rPr>
+              <a:t>selex</a:t>
+            </a:r>
+            <a:r>
+              <a:rPr lang="en-US" sz="1600" dirty="0" smtClean="0">
+                <a:latin typeface="Courier New" panose="02070309020205020404" pitchFamily="49" charset="0"/>
+                <a:cs typeface="Courier New" panose="02070309020205020404" pitchFamily="49" charset="0"/>
+              </a:rPr>
+              <a:t> type (</a:t>
+            </a:r>
+            <a:r>
+              <a:rPr lang="en-US" sz="1600" dirty="0" err="1" smtClean="0">
+                <a:latin typeface="Courier New" panose="02070309020205020404" pitchFamily="49" charset="0"/>
+                <a:cs typeface="Courier New" panose="02070309020205020404" pitchFamily="49" charset="0"/>
+              </a:rPr>
+              <a:t>flt</a:t>
+            </a:r>
+            <a:r>
+              <a:rPr lang="en-US" sz="1600" dirty="0" smtClean="0">
+                <a:latin typeface="Courier New" panose="02070309020205020404" pitchFamily="49" charset="0"/>
+                <a:cs typeface="Courier New" panose="02070309020205020404" pitchFamily="49" charset="0"/>
+              </a:rPr>
+              <a:t>), </a:t>
+            </a:r>
+            <a:r>
+              <a:rPr lang="en-US" sz="1600" dirty="0" err="1" smtClean="0">
+                <a:latin typeface="Courier New" panose="02070309020205020404" pitchFamily="49" charset="0"/>
+                <a:cs typeface="Courier New" panose="02070309020205020404" pitchFamily="49" charset="0"/>
+              </a:rPr>
+              <a:t>len</a:t>
+            </a:r>
+            <a:r>
+              <a:rPr lang="en-US" sz="1600" dirty="0" smtClean="0">
+                <a:latin typeface="Courier New" panose="02070309020205020404" pitchFamily="49" charset="0"/>
+                <a:cs typeface="Courier New" panose="02070309020205020404" pitchFamily="49" charset="0"/>
+              </a:rPr>
+              <a:t>=1/age=2, year, N </a:t>
+            </a:r>
+            <a:r>
+              <a:rPr lang="en-US" sz="1600" dirty="0" err="1" smtClean="0">
+                <a:latin typeface="Courier New" panose="02070309020205020404" pitchFamily="49" charset="0"/>
+                <a:cs typeface="Courier New" panose="02070309020205020404" pitchFamily="49" charset="0"/>
+              </a:rPr>
+              <a:t>selex</a:t>
+            </a:r>
+            <a:r>
+              <a:rPr lang="en-US" sz="1600" dirty="0" smtClean="0">
+                <a:latin typeface="Courier New" panose="02070309020205020404" pitchFamily="49" charset="0"/>
+                <a:cs typeface="Courier New" panose="02070309020205020404" pitchFamily="49" charset="0"/>
+              </a:rPr>
+              <a:t> bins (4 </a:t>
+            </a:r>
+            <a:r>
+              <a:rPr lang="en-US" sz="1600" dirty="0" err="1" smtClean="0">
+                <a:latin typeface="Courier New" panose="02070309020205020404" pitchFamily="49" charset="0"/>
+                <a:cs typeface="Courier New" panose="02070309020205020404" pitchFamily="49" charset="0"/>
+              </a:rPr>
+              <a:t>vals</a:t>
+            </a:r>
+            <a:r>
+              <a:rPr lang="en-US" sz="1600" dirty="0" smtClean="0">
+                <a:latin typeface="Courier New" panose="02070309020205020404" pitchFamily="49" charset="0"/>
+                <a:cs typeface="Courier New" panose="02070309020205020404" pitchFamily="49" charset="0"/>
+              </a:rPr>
+              <a:t>)</a:t>
+            </a:r>
+          </a:p>
+          <a:p>
+            <a:r>
+              <a:rPr lang="en-US" sz="1600" dirty="0" smtClean="0">
+                <a:latin typeface="Courier New" panose="02070309020205020404" pitchFamily="49" charset="0"/>
+                <a:cs typeface="Courier New" panose="02070309020205020404" pitchFamily="49" charset="0"/>
+              </a:rPr>
+              <a:t>1  10      # Growth pattern, N growth ages (2 values)</a:t>
+            </a:r>
+          </a:p>
+          <a:p>
+            <a:r>
+              <a:rPr lang="en-US" sz="1600" dirty="0" smtClean="0">
+                <a:latin typeface="Courier New" panose="02070309020205020404" pitchFamily="49" charset="0"/>
+                <a:cs typeface="Courier New" panose="02070309020205020404" pitchFamily="49" charset="0"/>
+              </a:rPr>
+              <a:t>1 -1  2    # </a:t>
+            </a:r>
+            <a:r>
+              <a:rPr lang="en-US" sz="1600" dirty="0" err="1" smtClean="0">
+                <a:latin typeface="Courier New" panose="02070309020205020404" pitchFamily="49" charset="0"/>
+                <a:cs typeface="Courier New" panose="02070309020205020404" pitchFamily="49" charset="0"/>
+              </a:rPr>
+              <a:t>NatAge_area</a:t>
+            </a:r>
+            <a:r>
+              <a:rPr lang="en-US" sz="1600" dirty="0" smtClean="0">
+                <a:latin typeface="Courier New" panose="02070309020205020404" pitchFamily="49" charset="0"/>
+                <a:cs typeface="Courier New" panose="02070309020205020404" pitchFamily="49" charset="0"/>
+              </a:rPr>
+              <a:t>(-1 for all), </a:t>
+            </a:r>
+            <a:r>
+              <a:rPr lang="en-US" sz="1600" dirty="0" err="1" smtClean="0">
+                <a:latin typeface="Courier New" panose="02070309020205020404" pitchFamily="49" charset="0"/>
+                <a:cs typeface="Courier New" panose="02070309020205020404" pitchFamily="49" charset="0"/>
+              </a:rPr>
+              <a:t>NatAge_yr</a:t>
+            </a:r>
+            <a:r>
+              <a:rPr lang="en-US" sz="1600" dirty="0" smtClean="0">
+                <a:latin typeface="Courier New" panose="02070309020205020404" pitchFamily="49" charset="0"/>
+                <a:cs typeface="Courier New" panose="02070309020205020404" pitchFamily="49" charset="0"/>
+              </a:rPr>
+              <a:t>, N </a:t>
+            </a:r>
+            <a:r>
+              <a:rPr lang="en-US" sz="1600" dirty="0" err="1" smtClean="0">
+                <a:latin typeface="Courier New" panose="02070309020205020404" pitchFamily="49" charset="0"/>
+                <a:cs typeface="Courier New" panose="02070309020205020404" pitchFamily="49" charset="0"/>
+              </a:rPr>
+              <a:t>Natages</a:t>
+            </a:r>
+            <a:r>
+              <a:rPr lang="en-US" sz="1600" dirty="0" smtClean="0">
+                <a:latin typeface="Courier New" panose="02070309020205020404" pitchFamily="49" charset="0"/>
+                <a:cs typeface="Courier New" panose="02070309020205020404" pitchFamily="49" charset="0"/>
+              </a:rPr>
+              <a:t> (3 values)</a:t>
+            </a:r>
+          </a:p>
+          <a:p>
+            <a:r>
+              <a:rPr lang="en-US" sz="1600" dirty="0" smtClean="0">
+                <a:latin typeface="Courier New" panose="02070309020205020404" pitchFamily="49" charset="0"/>
+                <a:cs typeface="Courier New" panose="02070309020205020404" pitchFamily="49" charset="0"/>
+              </a:rPr>
+              <a:t>-1 1       # vector with </a:t>
+            </a:r>
+            <a:r>
+              <a:rPr lang="en-US" sz="1600" dirty="0" err="1" smtClean="0">
+                <a:latin typeface="Courier New" panose="02070309020205020404" pitchFamily="49" charset="0"/>
+                <a:cs typeface="Courier New" panose="02070309020205020404" pitchFamily="49" charset="0"/>
+              </a:rPr>
+              <a:t>selex</a:t>
+            </a:r>
+            <a:r>
+              <a:rPr lang="en-US" sz="1600" dirty="0" smtClean="0">
+                <a:latin typeface="Courier New" panose="02070309020205020404" pitchFamily="49" charset="0"/>
+                <a:cs typeface="Courier New" panose="02070309020205020404" pitchFamily="49" charset="0"/>
+              </a:rPr>
+              <a:t> </a:t>
+            </a:r>
+            <a:r>
+              <a:rPr lang="en-US" sz="1600" dirty="0" err="1" smtClean="0">
+                <a:latin typeface="Courier New" panose="02070309020205020404" pitchFamily="49" charset="0"/>
+                <a:cs typeface="Courier New" panose="02070309020205020404" pitchFamily="49" charset="0"/>
+              </a:rPr>
+              <a:t>std</a:t>
+            </a:r>
+            <a:r>
+              <a:rPr lang="en-US" sz="1600" dirty="0" smtClean="0">
+                <a:latin typeface="Courier New" panose="02070309020205020404" pitchFamily="49" charset="0"/>
+                <a:cs typeface="Courier New" panose="02070309020205020404" pitchFamily="49" charset="0"/>
+              </a:rPr>
+              <a:t> bin picks</a:t>
+            </a:r>
+          </a:p>
+          <a:p>
+            <a:r>
+              <a:rPr lang="en-US" sz="1600" dirty="0" smtClean="0">
+                <a:latin typeface="Courier New" panose="02070309020205020404" pitchFamily="49" charset="0"/>
+                <a:cs typeface="Courier New" panose="02070309020205020404" pitchFamily="49" charset="0"/>
+              </a:rPr>
+              <a:t>5 10 15 20 25 30 35 40 45 50 # vector with growth </a:t>
+            </a:r>
+            <a:r>
+              <a:rPr lang="en-US" sz="1600" dirty="0" err="1" smtClean="0">
+                <a:latin typeface="Courier New" panose="02070309020205020404" pitchFamily="49" charset="0"/>
+                <a:cs typeface="Courier New" panose="02070309020205020404" pitchFamily="49" charset="0"/>
+              </a:rPr>
+              <a:t>std</a:t>
+            </a:r>
+            <a:r>
+              <a:rPr lang="en-US" sz="1600" dirty="0" smtClean="0">
+                <a:latin typeface="Courier New" panose="02070309020205020404" pitchFamily="49" charset="0"/>
+                <a:cs typeface="Courier New" panose="02070309020205020404" pitchFamily="49" charset="0"/>
+              </a:rPr>
+              <a:t> bin picks</a:t>
+            </a:r>
+          </a:p>
+          <a:p>
+            <a:r>
+              <a:rPr lang="en-US" sz="1600" dirty="0" smtClean="0">
+                <a:latin typeface="Courier New" panose="02070309020205020404" pitchFamily="49" charset="0"/>
+                <a:cs typeface="Courier New" panose="02070309020205020404" pitchFamily="49" charset="0"/>
+              </a:rPr>
+              <a:t>-1 1       # vector with </a:t>
+            </a:r>
+            <a:r>
+              <a:rPr lang="en-US" sz="1600" dirty="0" err="1" smtClean="0">
+                <a:latin typeface="Courier New" panose="02070309020205020404" pitchFamily="49" charset="0"/>
+                <a:cs typeface="Courier New" panose="02070309020205020404" pitchFamily="49" charset="0"/>
+              </a:rPr>
+              <a:t>NatAge</a:t>
+            </a:r>
+            <a:r>
+              <a:rPr lang="en-US" sz="1600" dirty="0" smtClean="0">
+                <a:latin typeface="Courier New" panose="02070309020205020404" pitchFamily="49" charset="0"/>
+                <a:cs typeface="Courier New" panose="02070309020205020404" pitchFamily="49" charset="0"/>
+              </a:rPr>
+              <a:t> </a:t>
+            </a:r>
+            <a:r>
+              <a:rPr lang="en-US" sz="1600" dirty="0" err="1" smtClean="0">
+                <a:latin typeface="Courier New" panose="02070309020205020404" pitchFamily="49" charset="0"/>
+                <a:cs typeface="Courier New" panose="02070309020205020404" pitchFamily="49" charset="0"/>
+              </a:rPr>
+              <a:t>std</a:t>
+            </a:r>
+            <a:r>
+              <a:rPr lang="en-US" sz="1600" dirty="0" smtClean="0">
+                <a:latin typeface="Courier New" panose="02070309020205020404" pitchFamily="49" charset="0"/>
+                <a:cs typeface="Courier New" panose="02070309020205020404" pitchFamily="49" charset="0"/>
+              </a:rPr>
+              <a:t> bin picks</a:t>
+            </a:r>
+          </a:p>
+          <a:p>
+            <a:r>
+              <a:rPr lang="en-US" sz="1600" dirty="0" smtClean="0">
+                <a:latin typeface="Courier New" panose="02070309020205020404" pitchFamily="49" charset="0"/>
+                <a:cs typeface="Courier New" panose="02070309020205020404" pitchFamily="49" charset="0"/>
+              </a:rPr>
+              <a:t>999 # end of control file</a:t>
+            </a:r>
+          </a:p>
+        </p:txBody>
+      </p:sp>
+      <p:cxnSp>
+        <p:nvCxnSpPr>
+          <p:cNvPr id="13" name="Straight Arrow Connector 12"/>
+          <p:cNvCxnSpPr/>
+          <p:nvPr/>
+        </p:nvCxnSpPr>
+        <p:spPr>
+          <a:xfrm flipH="1" flipV="1">
+            <a:off x="3124200" y="5429250"/>
+            <a:ext cx="609600" cy="457200"/>
+          </a:xfrm>
+          <a:prstGeom prst="straightConnector1">
+            <a:avLst/>
+          </a:prstGeom>
+          <a:ln w="38100">
+            <a:solidFill>
+              <a:srgbClr val="00B050"/>
+            </a:solidFill>
+            <a:tailEnd type="arrow"/>
+          </a:ln>
+        </p:spPr>
+        <p:style>
+          <a:lnRef idx="1">
+            <a:schemeClr val="accent1"/>
+          </a:lnRef>
+          <a:fillRef idx="0">
+            <a:schemeClr val="accent1"/>
+          </a:fillRef>
+          <a:effectRef idx="0">
+            <a:schemeClr val="accent1"/>
+          </a:effectRef>
+          <a:fontRef idx="minor">
+            <a:schemeClr val="tx1"/>
+          </a:fontRef>
+        </p:style>
+      </p:cxnSp>
+      <p:cxnSp>
+        <p:nvCxnSpPr>
+          <p:cNvPr id="17" name="Straight Arrow Connector 16"/>
+          <p:cNvCxnSpPr/>
+          <p:nvPr/>
+        </p:nvCxnSpPr>
+        <p:spPr>
+          <a:xfrm flipH="1" flipV="1">
+            <a:off x="4314970" y="4343400"/>
+            <a:ext cx="609600" cy="457200"/>
+          </a:xfrm>
+          <a:prstGeom prst="straightConnector1">
+            <a:avLst/>
+          </a:prstGeom>
+          <a:ln w="38100">
+            <a:solidFill>
+              <a:srgbClr val="00B050"/>
+            </a:solidFill>
+            <a:tailEnd type="arrow"/>
+          </a:ln>
+        </p:spPr>
+        <p:style>
+          <a:lnRef idx="1">
+            <a:schemeClr val="accent1"/>
+          </a:lnRef>
+          <a:fillRef idx="0">
+            <a:schemeClr val="accent1"/>
+          </a:fillRef>
+          <a:effectRef idx="0">
+            <a:schemeClr val="accent1"/>
+          </a:effectRef>
+          <a:fontRef idx="minor">
+            <a:schemeClr val="tx1"/>
+          </a:fontRef>
+        </p:style>
+      </p:cxnSp>
+    </p:spTree>
+    <p:extLst>
+      <p:ext uri="{BB962C8B-B14F-4D97-AF65-F5344CB8AC3E}">
+        <p14:creationId xmlns:p14="http://schemas.microsoft.com/office/powerpoint/2010/main" val="1440411319"/>
       </p:ext>
     </p:extLst>
   </p:cSld>
@@ -5663,6 +5699,13 @@
   <p:clrMapOvr>
     <a:masterClrMapping/>
   </p:clrMapOvr>
+  <p:timing>
+    <p:tnLst>
+      <p:par>
+        <p:cTn id="1" dur="indefinite" restart="never" nodeType="tmRoot"/>
+      </p:par>
+    </p:tnLst>
+  </p:timing>
 </p:sld>
 </file>
 
@@ -5828,6 +5871,13 @@
   <p:clrMapOvr>
     <a:masterClrMapping/>
   </p:clrMapOvr>
+  <p:timing>
+    <p:tnLst>
+      <p:par>
+        <p:cTn id="1" dur="indefinite" restart="never" nodeType="tmRoot"/>
+      </p:par>
+    </p:tnLst>
+  </p:timing>
 </p:sld>
 </file>
 
@@ -6004,6 +6054,13 @@
   <p:clrMapOvr>
     <a:masterClrMapping/>
   </p:clrMapOvr>
+  <p:timing>
+    <p:tnLst>
+      <p:par>
+        <p:cTn id="1" dur="indefinite" restart="never" nodeType="tmRoot"/>
+      </p:par>
+    </p:tnLst>
+  </p:timing>
 </p:sld>
 </file>
 
@@ -6400,14 +6457,14 @@
           <a:p>
             <a:pPr lvl="1"/>
             <a:r>
-              <a:rPr lang="en-US" sz="2000" smtClean="0"/>
+              <a:rPr lang="en-US" sz="2000" dirty="0" smtClean="0"/>
               <a:t>Growth platoons and growth morphs</a:t>
             </a:r>
           </a:p>
           <a:p>
             <a:pPr lvl="1"/>
             <a:r>
-              <a:rPr lang="en-US" sz="2000" smtClean="0"/>
+              <a:rPr lang="en-US" sz="2000" dirty="0" smtClean="0"/>
               <a:t>Time-varying </a:t>
             </a:r>
             <a:r>
@@ -6466,6 +6523,13 @@
   <p:clrMapOvr>
     <a:masterClrMapping/>
   </p:clrMapOvr>
+  <p:timing>
+    <p:tnLst>
+      <p:par>
+        <p:cTn id="1" dur="indefinite" restart="never" nodeType="tmRoot"/>
+      </p:par>
+    </p:tnLst>
+  </p:timing>
 </p:sld>
 </file>
 
@@ -10687,6 +10751,13 @@
   <p:clrMapOvr>
     <a:masterClrMapping/>
   </p:clrMapOvr>
+  <p:timing>
+    <p:tnLst>
+      <p:par>
+        <p:cTn id="1" dur="indefinite" restart="never" nodeType="tmRoot"/>
+      </p:par>
+    </p:tnLst>
+  </p:timing>
 </p:sld>
 </file>
 
@@ -12349,6 +12420,672 @@
 </p:sld>
 </file>
 
+<file path=ppt/slides/slide36.xml><?xml version="1.0" encoding="utf-8"?>
+<p:sld xmlns:a="http://schemas.openxmlformats.org/drawingml/2006/main" xmlns:r="http://schemas.openxmlformats.org/officeDocument/2006/relationships" xmlns:p="http://schemas.openxmlformats.org/presentationml/2006/main">
+  <p:cSld>
+    <p:spTree>
+      <p:nvGrpSpPr>
+        <p:cNvPr id="1" name=""/>
+        <p:cNvGrpSpPr/>
+        <p:nvPr/>
+      </p:nvGrpSpPr>
+      <p:grpSpPr>
+        <a:xfrm>
+          <a:off x="0" y="0"/>
+          <a:ext cx="0" cy="0"/>
+          <a:chOff x="0" y="0"/>
+          <a:chExt cx="0" cy="0"/>
+        </a:xfrm>
+      </p:grpSpPr>
+      <p:sp>
+        <p:nvSpPr>
+          <p:cNvPr id="2" name="Title 1"/>
+          <p:cNvSpPr>
+            <a:spLocks noGrp="1"/>
+          </p:cNvSpPr>
+          <p:nvPr>
+            <p:ph type="title"/>
+          </p:nvPr>
+        </p:nvSpPr>
+        <p:spPr/>
+        <p:txBody>
+          <a:bodyPr>
+            <a:normAutofit/>
+          </a:bodyPr>
+          <a:lstStyle/>
+          <a:p>
+            <a:r>
+              <a:rPr lang="en-US" dirty="0" smtClean="0"/>
+              <a:t>Alternatives to von Bertalanffy: age-specific </a:t>
+            </a:r>
+            <a:r>
+              <a:rPr lang="en-US" i="1" dirty="0" smtClean="0"/>
+              <a:t>k</a:t>
+            </a:r>
+            <a:endParaRPr lang="en-US" i="1" dirty="0"/>
+          </a:p>
+        </p:txBody>
+      </p:sp>
+      <p:sp>
+        <p:nvSpPr>
+          <p:cNvPr id="5" name="Content Placeholder 4"/>
+          <p:cNvSpPr>
+            <a:spLocks noGrp="1"/>
+          </p:cNvSpPr>
+          <p:nvPr>
+            <p:ph idx="1"/>
+          </p:nvPr>
+        </p:nvSpPr>
+        <p:spPr/>
+        <p:txBody>
+          <a:bodyPr>
+            <a:normAutofit/>
+          </a:bodyPr>
+          <a:lstStyle/>
+          <a:p>
+            <a:pPr marL="0" indent="0">
+              <a:buNone/>
+            </a:pPr>
+            <a:r>
+              <a:rPr lang="en-US" sz="2000" dirty="0">
+                <a:latin typeface="Courier New" panose="02070309020205020404" pitchFamily="49" charset="0"/>
+                <a:cs typeface="Courier New" panose="02070309020205020404" pitchFamily="49" charset="0"/>
+              </a:rPr>
+              <a:t>3</a:t>
+            </a:r>
+            <a:r>
+              <a:rPr lang="en-US" sz="2000" dirty="0" smtClean="0">
+                <a:latin typeface="Courier New" panose="02070309020205020404" pitchFamily="49" charset="0"/>
+                <a:cs typeface="Courier New" panose="02070309020205020404" pitchFamily="49" charset="0"/>
+              </a:rPr>
+              <a:t> # </a:t>
+            </a:r>
+            <a:r>
+              <a:rPr lang="en-US" sz="2000" dirty="0" err="1" smtClean="0">
+                <a:latin typeface="Courier New" panose="02070309020205020404" pitchFamily="49" charset="0"/>
+                <a:cs typeface="Courier New" panose="02070309020205020404" pitchFamily="49" charset="0"/>
+              </a:rPr>
+              <a:t>GrowthModel</a:t>
+            </a:r>
+            <a:r>
+              <a:rPr lang="en-US" sz="2000" dirty="0" smtClean="0">
+                <a:latin typeface="Courier New" panose="02070309020205020404" pitchFamily="49" charset="0"/>
+                <a:cs typeface="Courier New" panose="02070309020205020404" pitchFamily="49" charset="0"/>
+              </a:rPr>
+              <a:t>: 1=</a:t>
+            </a:r>
+            <a:r>
+              <a:rPr lang="en-US" sz="2000" dirty="0" err="1" smtClean="0">
+                <a:latin typeface="Courier New" panose="02070309020205020404" pitchFamily="49" charset="0"/>
+                <a:cs typeface="Courier New" panose="02070309020205020404" pitchFamily="49" charset="0"/>
+              </a:rPr>
+              <a:t>vonBert</a:t>
+            </a:r>
+            <a:r>
+              <a:rPr lang="en-US" sz="2000" dirty="0" smtClean="0">
+                <a:latin typeface="Courier New" panose="02070309020205020404" pitchFamily="49" charset="0"/>
+                <a:cs typeface="Courier New" panose="02070309020205020404" pitchFamily="49" charset="0"/>
+              </a:rPr>
+              <a:t> with L1&amp;L2; 2=Richards with L1&amp;L2; 3=</a:t>
+            </a:r>
+            <a:r>
+              <a:rPr lang="en-US" sz="2000" dirty="0" err="1" smtClean="0">
+                <a:latin typeface="Courier New" panose="02070309020205020404" pitchFamily="49" charset="0"/>
+                <a:cs typeface="Courier New" panose="02070309020205020404" pitchFamily="49" charset="0"/>
+              </a:rPr>
+              <a:t>age_speciific_K</a:t>
+            </a:r>
+            <a:r>
+              <a:rPr lang="en-US" sz="2000" dirty="0" smtClean="0">
+                <a:latin typeface="Courier New" panose="02070309020205020404" pitchFamily="49" charset="0"/>
+                <a:cs typeface="Courier New" panose="02070309020205020404" pitchFamily="49" charset="0"/>
+              </a:rPr>
+              <a:t>; 4=not implemented</a:t>
+            </a:r>
+          </a:p>
+          <a:p>
+            <a:endParaRPr lang="en-US" sz="2000" dirty="0">
+              <a:latin typeface="Courier New" panose="02070309020205020404" pitchFamily="49" charset="0"/>
+              <a:cs typeface="Courier New" panose="02070309020205020404" pitchFamily="49" charset="0"/>
+            </a:endParaRPr>
+          </a:p>
+        </p:txBody>
+      </p:sp>
+      <p:sp>
+        <p:nvSpPr>
+          <p:cNvPr id="4" name="Slide Number Placeholder 3"/>
+          <p:cNvSpPr>
+            <a:spLocks noGrp="1"/>
+          </p:cNvSpPr>
+          <p:nvPr>
+            <p:ph type="sldNum" sz="quarter" idx="12"/>
+          </p:nvPr>
+        </p:nvSpPr>
+        <p:spPr/>
+        <p:txBody>
+          <a:bodyPr/>
+          <a:lstStyle/>
+          <a:p>
+            <a:fld id="{3317FC69-9C55-40B2-912C-F83C681DAE11}" type="slidenum">
+              <a:rPr lang="en-US" smtClean="0"/>
+              <a:t>36</a:t>
+            </a:fld>
+            <a:endParaRPr lang="en-US"/>
+          </a:p>
+        </p:txBody>
+      </p:sp>
+    </p:spTree>
+    <p:extLst>
+      <p:ext uri="{BB962C8B-B14F-4D97-AF65-F5344CB8AC3E}">
+        <p14:creationId xmlns:p14="http://schemas.microsoft.com/office/powerpoint/2010/main" val="1422776444"/>
+      </p:ext>
+    </p:extLst>
+  </p:cSld>
+  <p:clrMapOvr>
+    <a:masterClrMapping/>
+  </p:clrMapOvr>
+</p:sld>
+</file>
+
+<file path=ppt/slides/slide37.xml><?xml version="1.0" encoding="utf-8"?>
+<p:sld xmlns:a="http://schemas.openxmlformats.org/drawingml/2006/main" xmlns:r="http://schemas.openxmlformats.org/officeDocument/2006/relationships" xmlns:p="http://schemas.openxmlformats.org/presentationml/2006/main">
+  <p:cSld>
+    <p:spTree>
+      <p:nvGrpSpPr>
+        <p:cNvPr id="1" name=""/>
+        <p:cNvGrpSpPr/>
+        <p:nvPr/>
+      </p:nvGrpSpPr>
+      <p:grpSpPr>
+        <a:xfrm>
+          <a:off x="0" y="0"/>
+          <a:ext cx="0" cy="0"/>
+          <a:chOff x="0" y="0"/>
+          <a:chExt cx="0" cy="0"/>
+        </a:xfrm>
+      </p:grpSpPr>
+      <p:pic>
+        <p:nvPicPr>
+          <p:cNvPr id="15362" name="Picture 2"/>
+          <p:cNvPicPr>
+            <a:picLocks noChangeAspect="1" noChangeArrowheads="1"/>
+          </p:cNvPicPr>
+          <p:nvPr/>
+        </p:nvPicPr>
+        <p:blipFill>
+          <a:blip r:embed="rId2">
+            <a:extLst>
+              <a:ext uri="{28A0092B-C50C-407E-A947-70E740481C1C}">
+                <a14:useLocalDpi xmlns:a14="http://schemas.microsoft.com/office/drawing/2010/main" val="0"/>
+              </a:ext>
+            </a:extLst>
+          </a:blip>
+          <a:srcRect/>
+          <a:stretch>
+            <a:fillRect/>
+          </a:stretch>
+        </p:blipFill>
+        <p:spPr bwMode="auto">
+          <a:xfrm>
+            <a:off x="3324530" y="1747992"/>
+            <a:ext cx="5967107" cy="4957608"/>
+          </a:xfrm>
+          <a:prstGeom prst="rect">
+            <a:avLst/>
+          </a:prstGeom>
+          <a:noFill/>
+          <a:ln>
+            <a:noFill/>
+          </a:ln>
+          <a:extLst>
+            <a:ext uri="{909E8E84-426E-40DD-AFC4-6F175D3DCCD1}">
+              <a14:hiddenFill xmlns:a14="http://schemas.microsoft.com/office/drawing/2010/main">
+                <a:solidFill>
+                  <a:schemeClr val="accent1"/>
+                </a:solidFill>
+              </a14:hiddenFill>
+            </a:ext>
+            <a:ext uri="{91240B29-F687-4F45-9708-019B960494DF}">
+              <a14:hiddenLine xmlns:a14="http://schemas.microsoft.com/office/drawing/2010/main" w="9525">
+                <a:solidFill>
+                  <a:schemeClr val="tx1"/>
+                </a:solidFill>
+                <a:miter lim="800000"/>
+                <a:headEnd/>
+                <a:tailEnd/>
+              </a14:hiddenLine>
+            </a:ext>
+          </a:extLst>
+        </p:spPr>
+      </p:pic>
+      <p:sp>
+        <p:nvSpPr>
+          <p:cNvPr id="2" name="Title 1"/>
+          <p:cNvSpPr>
+            <a:spLocks noGrp="1"/>
+          </p:cNvSpPr>
+          <p:nvPr>
+            <p:ph type="title"/>
+          </p:nvPr>
+        </p:nvSpPr>
+        <p:spPr/>
+        <p:txBody>
+          <a:bodyPr/>
+          <a:lstStyle/>
+          <a:p>
+            <a:r>
+              <a:rPr lang="en-US" dirty="0" smtClean="0"/>
+              <a:t>Time-varying growth</a:t>
+            </a:r>
+            <a:endParaRPr lang="en-US" dirty="0"/>
+          </a:p>
+        </p:txBody>
+      </p:sp>
+      <p:sp>
+        <p:nvSpPr>
+          <p:cNvPr id="3" name="Content Placeholder 2"/>
+          <p:cNvSpPr>
+            <a:spLocks noGrp="1"/>
+          </p:cNvSpPr>
+          <p:nvPr>
+            <p:ph idx="1"/>
+          </p:nvPr>
+        </p:nvSpPr>
+        <p:spPr>
+          <a:xfrm>
+            <a:off x="152400" y="914400"/>
+            <a:ext cx="8534400" cy="5211763"/>
+          </a:xfrm>
+        </p:spPr>
+        <p:txBody>
+          <a:bodyPr/>
+          <a:lstStyle/>
+          <a:p>
+            <a:r>
+              <a:rPr lang="en-US" dirty="0" smtClean="0"/>
+              <a:t>Ask Athol Whitten</a:t>
+            </a:r>
+          </a:p>
+          <a:p>
+            <a:r>
+              <a:rPr lang="en-US" dirty="0" smtClean="0"/>
+              <a:t>More on this at </a:t>
+            </a:r>
+            <a:br>
+              <a:rPr lang="en-US" dirty="0" smtClean="0"/>
+            </a:br>
+            <a:r>
+              <a:rPr lang="en-US" dirty="0" smtClean="0"/>
+              <a:t>8am on Friday</a:t>
+            </a:r>
+            <a:endParaRPr lang="en-US" dirty="0"/>
+          </a:p>
+        </p:txBody>
+      </p:sp>
+      <p:sp>
+        <p:nvSpPr>
+          <p:cNvPr id="4" name="Slide Number Placeholder 3"/>
+          <p:cNvSpPr>
+            <a:spLocks noGrp="1"/>
+          </p:cNvSpPr>
+          <p:nvPr>
+            <p:ph type="sldNum" sz="quarter" idx="12"/>
+          </p:nvPr>
+        </p:nvSpPr>
+        <p:spPr/>
+        <p:txBody>
+          <a:bodyPr/>
+          <a:lstStyle/>
+          <a:p>
+            <a:fld id="{3317FC69-9C55-40B2-912C-F83C681DAE11}" type="slidenum">
+              <a:rPr lang="en-US" smtClean="0"/>
+              <a:t>37</a:t>
+            </a:fld>
+            <a:endParaRPr lang="en-US" dirty="0"/>
+          </a:p>
+        </p:txBody>
+      </p:sp>
+      <p:sp>
+        <p:nvSpPr>
+          <p:cNvPr id="6" name="TextBox 5"/>
+          <p:cNvSpPr txBox="1"/>
+          <p:nvPr/>
+        </p:nvSpPr>
+        <p:spPr>
+          <a:xfrm>
+            <a:off x="66965" y="6477000"/>
+            <a:ext cx="5190835" cy="307777"/>
+          </a:xfrm>
+          <a:prstGeom prst="rect">
+            <a:avLst/>
+          </a:prstGeom>
+          <a:noFill/>
+        </p:spPr>
+        <p:txBody>
+          <a:bodyPr wrap="square" rtlCol="0">
+            <a:spAutoFit/>
+          </a:bodyPr>
+          <a:lstStyle/>
+          <a:p>
+            <a:r>
+              <a:rPr lang="en-US" sz="1400" dirty="0" smtClean="0">
+                <a:solidFill>
+                  <a:schemeClr val="accent1">
+                    <a:lumMod val="75000"/>
+                  </a:schemeClr>
+                </a:solidFill>
+              </a:rPr>
+              <a:t>source:  Whitten et al. (2013)</a:t>
+            </a:r>
+            <a:endParaRPr lang="en-US" sz="1400" dirty="0">
+              <a:solidFill>
+                <a:schemeClr val="accent1">
+                  <a:lumMod val="75000"/>
+                </a:schemeClr>
+              </a:solidFill>
+            </a:endParaRPr>
+          </a:p>
+        </p:txBody>
+      </p:sp>
+    </p:spTree>
+    <p:extLst>
+      <p:ext uri="{BB962C8B-B14F-4D97-AF65-F5344CB8AC3E}">
+        <p14:creationId xmlns:p14="http://schemas.microsoft.com/office/powerpoint/2010/main" val="1884011602"/>
+      </p:ext>
+    </p:extLst>
+  </p:cSld>
+  <p:clrMapOvr>
+    <a:masterClrMapping/>
+  </p:clrMapOvr>
+</p:sld>
+</file>
+
+<file path=ppt/slides/slide38.xml><?xml version="1.0" encoding="utf-8"?>
+<p:sld xmlns:a="http://schemas.openxmlformats.org/drawingml/2006/main" xmlns:r="http://schemas.openxmlformats.org/officeDocument/2006/relationships" xmlns:p="http://schemas.openxmlformats.org/presentationml/2006/main">
+  <p:cSld>
+    <p:spTree>
+      <p:nvGrpSpPr>
+        <p:cNvPr id="1" name=""/>
+        <p:cNvGrpSpPr/>
+        <p:nvPr/>
+      </p:nvGrpSpPr>
+      <p:grpSpPr>
+        <a:xfrm>
+          <a:off x="0" y="0"/>
+          <a:ext cx="0" cy="0"/>
+          <a:chOff x="0" y="0"/>
+          <a:chExt cx="0" cy="0"/>
+        </a:xfrm>
+      </p:grpSpPr>
+      <p:sp>
+        <p:nvSpPr>
+          <p:cNvPr id="2" name="Title 1"/>
+          <p:cNvSpPr>
+            <a:spLocks noGrp="1"/>
+          </p:cNvSpPr>
+          <p:nvPr>
+            <p:ph type="title"/>
+          </p:nvPr>
+        </p:nvSpPr>
+        <p:spPr/>
+        <p:txBody>
+          <a:bodyPr/>
+          <a:lstStyle/>
+          <a:p>
+            <a:r>
+              <a:rPr lang="en-US" dirty="0" smtClean="0"/>
+              <a:t>Growth platoons</a:t>
+            </a:r>
+            <a:endParaRPr lang="en-US" dirty="0"/>
+          </a:p>
+        </p:txBody>
+      </p:sp>
+      <p:sp>
+        <p:nvSpPr>
+          <p:cNvPr id="3" name="Content Placeholder 2"/>
+          <p:cNvSpPr>
+            <a:spLocks noGrp="1"/>
+          </p:cNvSpPr>
+          <p:nvPr>
+            <p:ph idx="1"/>
+          </p:nvPr>
+        </p:nvSpPr>
+        <p:spPr>
+          <a:xfrm>
+            <a:off x="457200" y="685800"/>
+            <a:ext cx="8229600" cy="5211763"/>
+          </a:xfrm>
+        </p:spPr>
+        <p:txBody>
+          <a:bodyPr>
+            <a:normAutofit/>
+          </a:bodyPr>
+          <a:lstStyle/>
+          <a:p>
+            <a:pPr marL="0" indent="0">
+              <a:buNone/>
+            </a:pPr>
+            <a:r>
+              <a:rPr lang="en-US" sz="1400" dirty="0" smtClean="0">
+                <a:latin typeface="Courier New" panose="02070309020205020404" pitchFamily="49" charset="0"/>
+                <a:cs typeface="Courier New" panose="02070309020205020404" pitchFamily="49" charset="0"/>
+              </a:rPr>
+              <a:t>1 #_</a:t>
+            </a:r>
+            <a:r>
+              <a:rPr lang="en-US" sz="1400" dirty="0" err="1" smtClean="0">
+                <a:latin typeface="Courier New" panose="02070309020205020404" pitchFamily="49" charset="0"/>
+                <a:cs typeface="Courier New" panose="02070309020205020404" pitchFamily="49" charset="0"/>
+              </a:rPr>
+              <a:t>N_Growth_Patterns</a:t>
+            </a:r>
+            <a:endParaRPr lang="en-US" sz="1400" dirty="0" smtClean="0">
+              <a:latin typeface="Courier New" panose="02070309020205020404" pitchFamily="49" charset="0"/>
+              <a:cs typeface="Courier New" panose="02070309020205020404" pitchFamily="49" charset="0"/>
+            </a:endParaRPr>
+          </a:p>
+          <a:p>
+            <a:pPr marL="0" indent="0">
+              <a:buNone/>
+            </a:pPr>
+            <a:r>
+              <a:rPr lang="en-US" sz="1400" dirty="0" smtClean="0">
+                <a:latin typeface="Courier New" panose="02070309020205020404" pitchFamily="49" charset="0"/>
+                <a:cs typeface="Courier New" panose="02070309020205020404" pitchFamily="49" charset="0"/>
+              </a:rPr>
+              <a:t>5 #_</a:t>
+            </a:r>
+            <a:r>
+              <a:rPr lang="en-US" sz="1400" dirty="0" err="1" smtClean="0">
+                <a:latin typeface="Courier New" panose="02070309020205020404" pitchFamily="49" charset="0"/>
+                <a:cs typeface="Courier New" panose="02070309020205020404" pitchFamily="49" charset="0"/>
+              </a:rPr>
+              <a:t>N_Morphs_Within_GrowthPattern</a:t>
+            </a:r>
+            <a:r>
+              <a:rPr lang="en-US" sz="1400" dirty="0" smtClean="0">
+                <a:latin typeface="Courier New" panose="02070309020205020404" pitchFamily="49" charset="0"/>
+                <a:cs typeface="Courier New" panose="02070309020205020404" pitchFamily="49" charset="0"/>
+              </a:rPr>
+              <a:t> </a:t>
+            </a:r>
+          </a:p>
+          <a:p>
+            <a:pPr marL="0" indent="0">
+              <a:buNone/>
+            </a:pPr>
+            <a:r>
+              <a:rPr lang="en-US" sz="1400" dirty="0" smtClean="0">
+                <a:latin typeface="Courier New" panose="02070309020205020404" pitchFamily="49" charset="0"/>
+                <a:cs typeface="Courier New" panose="02070309020205020404" pitchFamily="49" charset="0"/>
+              </a:rPr>
+              <a:t>1 #_</a:t>
+            </a:r>
+            <a:r>
+              <a:rPr lang="en-US" sz="1400" dirty="0" err="1" smtClean="0">
+                <a:latin typeface="Courier New" panose="02070309020205020404" pitchFamily="49" charset="0"/>
+                <a:cs typeface="Courier New" panose="02070309020205020404" pitchFamily="49" charset="0"/>
+              </a:rPr>
+              <a:t>Morph_between</a:t>
+            </a:r>
+            <a:r>
+              <a:rPr lang="en-US" sz="1400" dirty="0" smtClean="0">
+                <a:latin typeface="Courier New" panose="02070309020205020404" pitchFamily="49" charset="0"/>
+                <a:cs typeface="Courier New" panose="02070309020205020404" pitchFamily="49" charset="0"/>
+              </a:rPr>
+              <a:t>/</a:t>
+            </a:r>
+            <a:r>
+              <a:rPr lang="en-US" sz="1400" dirty="0" err="1" smtClean="0">
+                <a:latin typeface="Courier New" panose="02070309020205020404" pitchFamily="49" charset="0"/>
+                <a:cs typeface="Courier New" panose="02070309020205020404" pitchFamily="49" charset="0"/>
+              </a:rPr>
+              <a:t>within_stdev_ratio</a:t>
+            </a:r>
+            <a:r>
+              <a:rPr lang="en-US" sz="1400" dirty="0" smtClean="0">
+                <a:latin typeface="Courier New" panose="02070309020205020404" pitchFamily="49" charset="0"/>
+                <a:cs typeface="Courier New" panose="02070309020205020404" pitchFamily="49" charset="0"/>
+              </a:rPr>
+              <a:t> (no read if </a:t>
+            </a:r>
+            <a:r>
+              <a:rPr lang="en-US" sz="1400" dirty="0" err="1" smtClean="0">
+                <a:latin typeface="Courier New" panose="02070309020205020404" pitchFamily="49" charset="0"/>
+                <a:cs typeface="Courier New" panose="02070309020205020404" pitchFamily="49" charset="0"/>
+              </a:rPr>
+              <a:t>N_morphs</a:t>
+            </a:r>
+            <a:r>
+              <a:rPr lang="en-US" sz="1400" dirty="0" smtClean="0">
+                <a:latin typeface="Courier New" panose="02070309020205020404" pitchFamily="49" charset="0"/>
+                <a:cs typeface="Courier New" panose="02070309020205020404" pitchFamily="49" charset="0"/>
+              </a:rPr>
+              <a:t>=1)</a:t>
+            </a:r>
+          </a:p>
+          <a:p>
+            <a:pPr marL="0" indent="0">
+              <a:buNone/>
+            </a:pPr>
+            <a:r>
+              <a:rPr lang="en-US" sz="1400" dirty="0" smtClean="0">
+                <a:latin typeface="Courier New" panose="02070309020205020404" pitchFamily="49" charset="0"/>
+                <a:cs typeface="Courier New" panose="02070309020205020404" pitchFamily="49" charset="0"/>
+              </a:rPr>
+              <a:t>-1 1 1 1 1 #</a:t>
+            </a:r>
+            <a:r>
+              <a:rPr lang="en-US" sz="1400" dirty="0" err="1" smtClean="0">
+                <a:latin typeface="Courier New" panose="02070309020205020404" pitchFamily="49" charset="0"/>
+                <a:cs typeface="Courier New" panose="02070309020205020404" pitchFamily="49" charset="0"/>
+              </a:rPr>
+              <a:t>vector_Morphdist</a:t>
+            </a:r>
+            <a:r>
+              <a:rPr lang="en-US" sz="1400" dirty="0" smtClean="0">
+                <a:latin typeface="Courier New" panose="02070309020205020404" pitchFamily="49" charset="0"/>
+                <a:cs typeface="Courier New" panose="02070309020205020404" pitchFamily="49" charset="0"/>
+              </a:rPr>
+              <a:t>_(-1_in_first_val_gives_normal_approx)</a:t>
+            </a:r>
+          </a:p>
+          <a:p>
+            <a:endParaRPr lang="en-US" sz="1400" dirty="0">
+              <a:latin typeface="Courier New" panose="02070309020205020404" pitchFamily="49" charset="0"/>
+              <a:cs typeface="Courier New" panose="02070309020205020404" pitchFamily="49" charset="0"/>
+            </a:endParaRPr>
+          </a:p>
+        </p:txBody>
+      </p:sp>
+      <p:sp>
+        <p:nvSpPr>
+          <p:cNvPr id="4" name="Slide Number Placeholder 3"/>
+          <p:cNvSpPr>
+            <a:spLocks noGrp="1"/>
+          </p:cNvSpPr>
+          <p:nvPr>
+            <p:ph type="sldNum" sz="quarter" idx="12"/>
+          </p:nvPr>
+        </p:nvSpPr>
+        <p:spPr/>
+        <p:txBody>
+          <a:bodyPr/>
+          <a:lstStyle/>
+          <a:p>
+            <a:fld id="{3317FC69-9C55-40B2-912C-F83C681DAE11}" type="slidenum">
+              <a:rPr lang="en-US" smtClean="0"/>
+              <a:t>38</a:t>
+            </a:fld>
+            <a:endParaRPr lang="en-US"/>
+          </a:p>
+        </p:txBody>
+      </p:sp>
+      <p:pic>
+        <p:nvPicPr>
+          <p:cNvPr id="16386" name="Picture 2"/>
+          <p:cNvPicPr>
+            <a:picLocks noChangeAspect="1" noChangeArrowheads="1"/>
+          </p:cNvPicPr>
+          <p:nvPr/>
+        </p:nvPicPr>
+        <p:blipFill rotWithShape="1">
+          <a:blip r:embed="rId2">
+            <a:extLst>
+              <a:ext uri="{28A0092B-C50C-407E-A947-70E740481C1C}">
+                <a14:useLocalDpi xmlns:a14="http://schemas.microsoft.com/office/drawing/2010/main" val="0"/>
+              </a:ext>
+            </a:extLst>
+          </a:blip>
+          <a:srcRect t="7172"/>
+          <a:stretch/>
+        </p:blipFill>
+        <p:spPr bwMode="auto">
+          <a:xfrm>
+            <a:off x="9525" y="1952625"/>
+            <a:ext cx="9144000" cy="4905375"/>
+          </a:xfrm>
+          <a:prstGeom prst="rect">
+            <a:avLst/>
+          </a:prstGeom>
+          <a:noFill/>
+          <a:ln>
+            <a:noFill/>
+          </a:ln>
+          <a:extLst>
+            <a:ext uri="{909E8E84-426E-40DD-AFC4-6F175D3DCCD1}">
+              <a14:hiddenFill xmlns:a14="http://schemas.microsoft.com/office/drawing/2010/main">
+                <a:solidFill>
+                  <a:schemeClr val="accent1"/>
+                </a:solidFill>
+              </a14:hiddenFill>
+            </a:ext>
+            <a:ext uri="{91240B29-F687-4F45-9708-019B960494DF}">
+              <a14:hiddenLine xmlns:a14="http://schemas.microsoft.com/office/drawing/2010/main" w="9525">
+                <a:solidFill>
+                  <a:schemeClr val="tx1"/>
+                </a:solidFill>
+                <a:miter lim="800000"/>
+                <a:headEnd/>
+                <a:tailEnd/>
+              </a14:hiddenLine>
+            </a:ext>
+          </a:extLst>
+        </p:spPr>
+      </p:pic>
+    </p:spTree>
+    <p:extLst>
+      <p:ext uri="{BB962C8B-B14F-4D97-AF65-F5344CB8AC3E}">
+        <p14:creationId xmlns:p14="http://schemas.microsoft.com/office/powerpoint/2010/main" val="1937208147"/>
+      </p:ext>
+    </p:extLst>
+  </p:cSld>
+  <p:clrMapOvr>
+    <a:masterClrMapping/>
+  </p:clrMapOvr>
+</p:sld>
+</file>
+
 <file path=ppt/slides/slide4.xml><?xml version="1.0" encoding="utf-8"?>
 <p:sld xmlns:a="http://schemas.openxmlformats.org/drawingml/2006/main" xmlns:r="http://schemas.openxmlformats.org/officeDocument/2006/relationships" xmlns:p="http://schemas.openxmlformats.org/presentationml/2006/main">
   <p:cSld>
@@ -12427,6 +13164,13 @@
   <p:clrMapOvr>
     <a:masterClrMapping/>
   </p:clrMapOvr>
+  <p:timing>
+    <p:tnLst>
+      <p:par>
+        <p:cTn id="1" dur="indefinite" restart="never" nodeType="tmRoot"/>
+      </p:par>
+    </p:tnLst>
+  </p:timing>
 </p:sld>
 </file>
 
@@ -13441,350 +14185,6 @@
 </file>
 
 <file path=ppt/slides/slide8.xml><?xml version="1.0" encoding="utf-8"?>
-<p:sld xmlns:a="http://schemas.openxmlformats.org/drawingml/2006/main" xmlns:r="http://schemas.openxmlformats.org/officeDocument/2006/relationships" xmlns:p="http://schemas.openxmlformats.org/presentationml/2006/main">
-  <p:cSld>
-    <p:spTree>
-      <p:nvGrpSpPr>
-        <p:cNvPr id="1" name=""/>
-        <p:cNvGrpSpPr/>
-        <p:nvPr/>
-      </p:nvGrpSpPr>
-      <p:grpSpPr>
-        <a:xfrm>
-          <a:off x="0" y="0"/>
-          <a:ext cx="0" cy="0"/>
-          <a:chOff x="0" y="0"/>
-          <a:chExt cx="0" cy="0"/>
-        </a:xfrm>
-      </p:grpSpPr>
-      <p:pic>
-        <p:nvPicPr>
-          <p:cNvPr id="4" name="Content Placeholder 3"/>
-          <p:cNvPicPr>
-            <a:picLocks noGrp="1" noChangeAspect="1"/>
-          </p:cNvPicPr>
-          <p:nvPr>
-            <p:ph idx="1"/>
-          </p:nvPr>
-        </p:nvPicPr>
-        <p:blipFill>
-          <a:blip r:embed="rId2">
-            <a:extLst>
-              <a:ext uri="{28A0092B-C50C-407E-A947-70E740481C1C}">
-                <a14:useLocalDpi xmlns:a14="http://schemas.microsoft.com/office/drawing/2010/main" val="0"/>
-              </a:ext>
-            </a:extLst>
-          </a:blip>
-          <a:stretch>
-            <a:fillRect/>
-          </a:stretch>
-        </p:blipFill>
-        <p:spPr>
-          <a:xfrm>
-            <a:off x="800100" y="1803400"/>
-            <a:ext cx="7543800" cy="5029200"/>
-          </a:xfrm>
-        </p:spPr>
-      </p:pic>
-      <p:sp>
-        <p:nvSpPr>
-          <p:cNvPr id="7" name="Content Placeholder 2"/>
-          <p:cNvSpPr txBox="1">
-            <a:spLocks/>
-          </p:cNvSpPr>
-          <p:nvPr/>
-        </p:nvSpPr>
-        <p:spPr>
-          <a:xfrm>
-            <a:off x="457200" y="762000"/>
-            <a:ext cx="8229600" cy="4525963"/>
-          </a:xfrm>
-          <a:prstGeom prst="rect">
-            <a:avLst/>
-          </a:prstGeom>
-        </p:spPr>
-        <p:txBody>
-          <a:bodyPr vert="horz" lIns="91440" tIns="45720" rIns="91440" bIns="45720" rtlCol="0">
-            <a:normAutofit/>
-          </a:bodyPr>
-          <a:lstStyle>
-            <a:lvl1pPr marL="342900" indent="-342900" algn="l" defTabSz="914400" rtl="0" eaLnBrk="1" latinLnBrk="0" hangingPunct="1">
-              <a:spcBef>
-                <a:spcPct val="20000"/>
-              </a:spcBef>
-              <a:buFont typeface="Arial" panose="020B0604020202020204" pitchFamily="34" charset="0"/>
-              <a:buChar char="•"/>
-              <a:defRPr sz="3200" kern="1200">
-                <a:solidFill>
-                  <a:schemeClr val="tx1"/>
-                </a:solidFill>
-                <a:latin typeface="+mn-lt"/>
-                <a:ea typeface="+mn-ea"/>
-                <a:cs typeface="+mn-cs"/>
-              </a:defRPr>
-            </a:lvl1pPr>
-            <a:lvl2pPr marL="742950" indent="-285750" algn="l" defTabSz="914400" rtl="0" eaLnBrk="1" latinLnBrk="0" hangingPunct="1">
-              <a:spcBef>
-                <a:spcPct val="20000"/>
-              </a:spcBef>
-              <a:buFont typeface="Arial" panose="020B0604020202020204" pitchFamily="34" charset="0"/>
-              <a:buChar char="–"/>
-              <a:defRPr sz="2800" kern="1200">
-                <a:solidFill>
-                  <a:schemeClr val="tx1"/>
-                </a:solidFill>
-                <a:latin typeface="+mn-lt"/>
-                <a:ea typeface="+mn-ea"/>
-                <a:cs typeface="+mn-cs"/>
-              </a:defRPr>
-            </a:lvl2pPr>
-            <a:lvl3pPr marL="1143000" indent="-228600" algn="l" defTabSz="914400" rtl="0" eaLnBrk="1" latinLnBrk="0" hangingPunct="1">
-              <a:spcBef>
-                <a:spcPct val="20000"/>
-              </a:spcBef>
-              <a:buFont typeface="Arial" panose="020B0604020202020204" pitchFamily="34" charset="0"/>
-              <a:buChar char="•"/>
-              <a:defRPr sz="2400" kern="1200">
-                <a:solidFill>
-                  <a:schemeClr val="tx1"/>
-                </a:solidFill>
-                <a:latin typeface="+mn-lt"/>
-                <a:ea typeface="+mn-ea"/>
-                <a:cs typeface="+mn-cs"/>
-              </a:defRPr>
-            </a:lvl3pPr>
-            <a:lvl4pPr marL="1600200" indent="-228600" algn="l" defTabSz="914400" rtl="0" eaLnBrk="1" latinLnBrk="0" hangingPunct="1">
-              <a:spcBef>
-                <a:spcPct val="20000"/>
-              </a:spcBef>
-              <a:buFont typeface="Arial" panose="020B0604020202020204" pitchFamily="34" charset="0"/>
-              <a:buChar char="–"/>
-              <a:defRPr sz="2000" kern="1200">
-                <a:solidFill>
-                  <a:schemeClr val="tx1"/>
-                </a:solidFill>
-                <a:latin typeface="+mn-lt"/>
-                <a:ea typeface="+mn-ea"/>
-                <a:cs typeface="+mn-cs"/>
-              </a:defRPr>
-            </a:lvl4pPr>
-            <a:lvl5pPr marL="2057400" indent="-228600" algn="l" defTabSz="914400" rtl="0" eaLnBrk="1" latinLnBrk="0" hangingPunct="1">
-              <a:spcBef>
-                <a:spcPct val="20000"/>
-              </a:spcBef>
-              <a:buFont typeface="Arial" panose="020B0604020202020204" pitchFamily="34" charset="0"/>
-              <a:buChar char="»"/>
-              <a:defRPr sz="2000" kern="1200">
-                <a:solidFill>
-                  <a:schemeClr val="tx1"/>
-                </a:solidFill>
-                <a:latin typeface="+mn-lt"/>
-                <a:ea typeface="+mn-ea"/>
-                <a:cs typeface="+mn-cs"/>
-              </a:defRPr>
-            </a:lvl5pPr>
-            <a:lvl6pPr marL="2514600" indent="-228600" algn="l" defTabSz="914400" rtl="0" eaLnBrk="1" latinLnBrk="0" hangingPunct="1">
-              <a:spcBef>
-                <a:spcPct val="20000"/>
-              </a:spcBef>
-              <a:buFont typeface="Arial" panose="020B0604020202020204" pitchFamily="34" charset="0"/>
-              <a:buChar char="•"/>
-              <a:defRPr sz="2000" kern="1200">
-                <a:solidFill>
-                  <a:schemeClr val="tx1"/>
-                </a:solidFill>
-                <a:latin typeface="+mn-lt"/>
-                <a:ea typeface="+mn-ea"/>
-                <a:cs typeface="+mn-cs"/>
-              </a:defRPr>
-            </a:lvl6pPr>
-            <a:lvl7pPr marL="2971800" indent="-228600" algn="l" defTabSz="914400" rtl="0" eaLnBrk="1" latinLnBrk="0" hangingPunct="1">
-              <a:spcBef>
-                <a:spcPct val="20000"/>
-              </a:spcBef>
-              <a:buFont typeface="Arial" panose="020B0604020202020204" pitchFamily="34" charset="0"/>
-              <a:buChar char="•"/>
-              <a:defRPr sz="2000" kern="1200">
-                <a:solidFill>
-                  <a:schemeClr val="tx1"/>
-                </a:solidFill>
-                <a:latin typeface="+mn-lt"/>
-                <a:ea typeface="+mn-ea"/>
-                <a:cs typeface="+mn-cs"/>
-              </a:defRPr>
-            </a:lvl7pPr>
-            <a:lvl8pPr marL="3429000" indent="-228600" algn="l" defTabSz="914400" rtl="0" eaLnBrk="1" latinLnBrk="0" hangingPunct="1">
-              <a:spcBef>
-                <a:spcPct val="20000"/>
-              </a:spcBef>
-              <a:buFont typeface="Arial" panose="020B0604020202020204" pitchFamily="34" charset="0"/>
-              <a:buChar char="•"/>
-              <a:defRPr sz="2000" kern="1200">
-                <a:solidFill>
-                  <a:schemeClr val="tx1"/>
-                </a:solidFill>
-                <a:latin typeface="+mn-lt"/>
-                <a:ea typeface="+mn-ea"/>
-                <a:cs typeface="+mn-cs"/>
-              </a:defRPr>
-            </a:lvl8pPr>
-            <a:lvl9pPr marL="3886200" indent="-228600" algn="l" defTabSz="914400" rtl="0" eaLnBrk="1" latinLnBrk="0" hangingPunct="1">
-              <a:spcBef>
-                <a:spcPct val="20000"/>
-              </a:spcBef>
-              <a:buFont typeface="Arial" panose="020B0604020202020204" pitchFamily="34" charset="0"/>
-              <a:buChar char="•"/>
-              <a:defRPr sz="2000" kern="1200">
-                <a:solidFill>
-                  <a:schemeClr val="tx1"/>
-                </a:solidFill>
-                <a:latin typeface="+mn-lt"/>
-                <a:ea typeface="+mn-ea"/>
-                <a:cs typeface="+mn-cs"/>
-              </a:defRPr>
-            </a:lvl9pPr>
-          </a:lstStyle>
-          <a:p>
-            <a:r>
-              <a:rPr lang="en-US" sz="2800" dirty="0" smtClean="0"/>
-              <a:t>Variability in length at age determined by </a:t>
-            </a:r>
-            <a:br>
-              <a:rPr lang="en-US" sz="2800" dirty="0" smtClean="0"/>
-            </a:br>
-            <a:r>
-              <a:rPr lang="en-US" sz="2800" dirty="0" smtClean="0"/>
-              <a:t>2-parameter “dogleg” function </a:t>
-            </a:r>
-            <a:br>
-              <a:rPr lang="en-US" sz="2800" dirty="0" smtClean="0"/>
-            </a:br>
-            <a:r>
-              <a:rPr lang="en-US" sz="2800" dirty="0" smtClean="0"/>
-              <a:t>(with same reference ages as growth curve)</a:t>
-            </a:r>
-          </a:p>
-        </p:txBody>
-      </p:sp>
-      <p:sp>
-        <p:nvSpPr>
-          <p:cNvPr id="5" name="Slide Number Placeholder 4"/>
-          <p:cNvSpPr>
-            <a:spLocks noGrp="1"/>
-          </p:cNvSpPr>
-          <p:nvPr>
-            <p:ph type="sldNum" sz="quarter" idx="12"/>
-          </p:nvPr>
-        </p:nvSpPr>
-        <p:spPr/>
-        <p:txBody>
-          <a:bodyPr/>
-          <a:lstStyle/>
-          <a:p>
-            <a:fld id="{3317FC69-9C55-40B2-912C-F83C681DAE11}" type="slidenum">
-              <a:rPr lang="en-US" smtClean="0"/>
-              <a:t>8</a:t>
-            </a:fld>
-            <a:endParaRPr lang="en-US"/>
-          </a:p>
-        </p:txBody>
-      </p:sp>
-      <p:sp>
-        <p:nvSpPr>
-          <p:cNvPr id="8" name="TextBox 7"/>
-          <p:cNvSpPr txBox="1"/>
-          <p:nvPr/>
-        </p:nvSpPr>
-        <p:spPr>
-          <a:xfrm>
-            <a:off x="66965" y="6477000"/>
-            <a:ext cx="5190835" cy="307777"/>
-          </a:xfrm>
-          <a:prstGeom prst="rect">
-            <a:avLst/>
-          </a:prstGeom>
-          <a:noFill/>
-        </p:spPr>
-        <p:txBody>
-          <a:bodyPr wrap="square" rtlCol="0">
-            <a:spAutoFit/>
-          </a:bodyPr>
-          <a:lstStyle/>
-          <a:p>
-            <a:r>
-              <a:rPr lang="en-US" sz="1400" dirty="0">
-                <a:solidFill>
-                  <a:schemeClr val="accent1">
-                    <a:lumMod val="75000"/>
-                  </a:schemeClr>
-                </a:solidFill>
-              </a:rPr>
-              <a:t>s</a:t>
-            </a:r>
-            <a:r>
-              <a:rPr lang="en-US" sz="1400" dirty="0" smtClean="0">
-                <a:solidFill>
-                  <a:schemeClr val="accent1">
-                    <a:lumMod val="75000"/>
-                  </a:schemeClr>
-                </a:solidFill>
-              </a:rPr>
-              <a:t>ource model: growth_illustration_offset2</a:t>
-            </a:r>
-            <a:endParaRPr lang="en-US" sz="1400" dirty="0">
-              <a:solidFill>
-                <a:schemeClr val="accent1">
-                  <a:lumMod val="75000"/>
-                </a:schemeClr>
-              </a:solidFill>
-            </a:endParaRPr>
-          </a:p>
-        </p:txBody>
-      </p:sp>
-      <p:sp>
-        <p:nvSpPr>
-          <p:cNvPr id="6" name="Title 5"/>
-          <p:cNvSpPr>
-            <a:spLocks noGrp="1"/>
-          </p:cNvSpPr>
-          <p:nvPr>
-            <p:ph type="title"/>
-          </p:nvPr>
-        </p:nvSpPr>
-        <p:spPr/>
-        <p:txBody>
-          <a:bodyPr/>
-          <a:lstStyle/>
-          <a:p>
-            <a:r>
-              <a:rPr lang="en-US" dirty="0" smtClean="0"/>
-              <a:t>Parameterization of growth: length variability</a:t>
-            </a:r>
-            <a:endParaRPr lang="en-US" dirty="0"/>
-          </a:p>
-        </p:txBody>
-      </p:sp>
-    </p:spTree>
-    <p:extLst>
-      <p:ext uri="{BB962C8B-B14F-4D97-AF65-F5344CB8AC3E}">
-        <p14:creationId xmlns:p14="http://schemas.microsoft.com/office/powerpoint/2010/main" val="201714957"/>
-      </p:ext>
-    </p:extLst>
-  </p:cSld>
-  <p:clrMapOvr>
-    <a:masterClrMapping/>
-  </p:clrMapOvr>
-  <p:timing>
-    <p:tnLst>
-      <p:par>
-        <p:cTn id="1" dur="indefinite" restart="never" nodeType="tmRoot"/>
-      </p:par>
-    </p:tnLst>
-  </p:timing>
-</p:sld>
-</file>
-
-<file path=ppt/slides/slide9.xml><?xml version="1.0" encoding="utf-8"?>
 <p:sld xmlns:a="http://schemas.openxmlformats.org/drawingml/2006/main" xmlns:r="http://schemas.openxmlformats.org/officeDocument/2006/relationships" xmlns:p="http://schemas.openxmlformats.org/presentationml/2006/main">
   <p:cSld>
     <p:spTree>
@@ -14189,7 +14589,7 @@
           <a:p>
             <a:fld id="{3317FC69-9C55-40B2-912C-F83C681DAE11}" type="slidenum">
               <a:rPr lang="en-US" smtClean="0"/>
-              <a:t>9</a:t>
+              <a:t>8</a:t>
             </a:fld>
             <a:endParaRPr lang="en-US"/>
           </a:p>
@@ -14274,6 +14674,528 @@
     <p:extLst>
       <p:ext uri="{BB962C8B-B14F-4D97-AF65-F5344CB8AC3E}">
         <p14:creationId xmlns:p14="http://schemas.microsoft.com/office/powerpoint/2010/main" val="162132732"/>
+      </p:ext>
+    </p:extLst>
+  </p:cSld>
+  <p:clrMapOvr>
+    <a:masterClrMapping/>
+  </p:clrMapOvr>
+  <p:timing>
+    <p:tnLst>
+      <p:par>
+        <p:cTn id="1" dur="indefinite" restart="never" nodeType="tmRoot"/>
+      </p:par>
+    </p:tnLst>
+  </p:timing>
+</p:sld>
+</file>
+
+<file path=ppt/slides/slide9.xml><?xml version="1.0" encoding="utf-8"?>
+<p:sld xmlns:a="http://schemas.openxmlformats.org/drawingml/2006/main" xmlns:r="http://schemas.openxmlformats.org/officeDocument/2006/relationships" xmlns:p="http://schemas.openxmlformats.org/presentationml/2006/main">
+  <p:cSld>
+    <p:spTree>
+      <p:nvGrpSpPr>
+        <p:cNvPr id="1" name=""/>
+        <p:cNvGrpSpPr/>
+        <p:nvPr/>
+      </p:nvGrpSpPr>
+      <p:grpSpPr>
+        <a:xfrm>
+          <a:off x="0" y="0"/>
+          <a:ext cx="0" cy="0"/>
+          <a:chOff x="0" y="0"/>
+          <a:chExt cx="0" cy="0"/>
+        </a:xfrm>
+      </p:grpSpPr>
+      <p:pic>
+        <p:nvPicPr>
+          <p:cNvPr id="4" name="Content Placeholder 3"/>
+          <p:cNvPicPr>
+            <a:picLocks noGrp="1" noChangeAspect="1"/>
+          </p:cNvPicPr>
+          <p:nvPr>
+            <p:ph idx="1"/>
+          </p:nvPr>
+        </p:nvPicPr>
+        <p:blipFill>
+          <a:blip r:embed="rId2">
+            <a:extLst>
+              <a:ext uri="{28A0092B-C50C-407E-A947-70E740481C1C}">
+                <a14:useLocalDpi xmlns:a14="http://schemas.microsoft.com/office/drawing/2010/main" val="0"/>
+              </a:ext>
+            </a:extLst>
+          </a:blip>
+          <a:stretch>
+            <a:fillRect/>
+          </a:stretch>
+        </p:blipFill>
+        <p:spPr>
+          <a:xfrm>
+            <a:off x="800100" y="1803400"/>
+            <a:ext cx="7543800" cy="5029200"/>
+          </a:xfrm>
+        </p:spPr>
+      </p:pic>
+      <p:sp>
+        <p:nvSpPr>
+          <p:cNvPr id="5" name="Slide Number Placeholder 4"/>
+          <p:cNvSpPr>
+            <a:spLocks noGrp="1"/>
+          </p:cNvSpPr>
+          <p:nvPr>
+            <p:ph type="sldNum" sz="quarter" idx="12"/>
+          </p:nvPr>
+        </p:nvSpPr>
+        <p:spPr/>
+        <p:txBody>
+          <a:bodyPr/>
+          <a:lstStyle/>
+          <a:p>
+            <a:fld id="{3317FC69-9C55-40B2-912C-F83C681DAE11}" type="slidenum">
+              <a:rPr lang="en-US" smtClean="0"/>
+              <a:t>9</a:t>
+            </a:fld>
+            <a:endParaRPr lang="en-US"/>
+          </a:p>
+        </p:txBody>
+      </p:sp>
+      <p:sp>
+        <p:nvSpPr>
+          <p:cNvPr id="8" name="TextBox 7"/>
+          <p:cNvSpPr txBox="1"/>
+          <p:nvPr/>
+        </p:nvSpPr>
+        <p:spPr>
+          <a:xfrm>
+            <a:off x="66965" y="6477000"/>
+            <a:ext cx="5190835" cy="307777"/>
+          </a:xfrm>
+          <a:prstGeom prst="rect">
+            <a:avLst/>
+          </a:prstGeom>
+          <a:noFill/>
+        </p:spPr>
+        <p:txBody>
+          <a:bodyPr wrap="square" rtlCol="0">
+            <a:spAutoFit/>
+          </a:bodyPr>
+          <a:lstStyle/>
+          <a:p>
+            <a:r>
+              <a:rPr lang="en-US" sz="1400" dirty="0">
+                <a:solidFill>
+                  <a:schemeClr val="accent1">
+                    <a:lumMod val="75000"/>
+                  </a:schemeClr>
+                </a:solidFill>
+              </a:rPr>
+              <a:t>s</a:t>
+            </a:r>
+            <a:r>
+              <a:rPr lang="en-US" sz="1400" dirty="0" smtClean="0">
+                <a:solidFill>
+                  <a:schemeClr val="accent1">
+                    <a:lumMod val="75000"/>
+                  </a:schemeClr>
+                </a:solidFill>
+              </a:rPr>
+              <a:t>ource model: growth_illustration_offset2</a:t>
+            </a:r>
+            <a:endParaRPr lang="en-US" sz="1400" dirty="0">
+              <a:solidFill>
+                <a:schemeClr val="accent1">
+                  <a:lumMod val="75000"/>
+                </a:schemeClr>
+              </a:solidFill>
+            </a:endParaRPr>
+          </a:p>
+        </p:txBody>
+      </p:sp>
+      <p:sp>
+        <p:nvSpPr>
+          <p:cNvPr id="9" name="Content Placeholder 2"/>
+          <p:cNvSpPr txBox="1">
+            <a:spLocks/>
+          </p:cNvSpPr>
+          <p:nvPr/>
+        </p:nvSpPr>
+        <p:spPr>
+          <a:xfrm>
+            <a:off x="457200" y="762000"/>
+            <a:ext cx="8229600" cy="4525963"/>
+          </a:xfrm>
+          <a:prstGeom prst="rect">
+            <a:avLst/>
+          </a:prstGeom>
+        </p:spPr>
+        <p:txBody>
+          <a:bodyPr vert="horz" lIns="91440" tIns="45720" rIns="91440" bIns="45720" rtlCol="0">
+            <a:normAutofit/>
+          </a:bodyPr>
+          <a:lstStyle>
+            <a:lvl1pPr marL="342900" indent="-342900" algn="l" defTabSz="914400" rtl="0" eaLnBrk="1" latinLnBrk="0" hangingPunct="1">
+              <a:spcBef>
+                <a:spcPct val="20000"/>
+              </a:spcBef>
+              <a:buFont typeface="Arial" panose="020B0604020202020204" pitchFamily="34" charset="0"/>
+              <a:buChar char="•"/>
+              <a:defRPr sz="3200" kern="1200">
+                <a:solidFill>
+                  <a:schemeClr val="tx1"/>
+                </a:solidFill>
+                <a:latin typeface="+mn-lt"/>
+                <a:ea typeface="+mn-ea"/>
+                <a:cs typeface="+mn-cs"/>
+              </a:defRPr>
+            </a:lvl1pPr>
+            <a:lvl2pPr marL="742950" indent="-285750" algn="l" defTabSz="914400" rtl="0" eaLnBrk="1" latinLnBrk="0" hangingPunct="1">
+              <a:spcBef>
+                <a:spcPct val="20000"/>
+              </a:spcBef>
+              <a:buFont typeface="Arial" panose="020B0604020202020204" pitchFamily="34" charset="0"/>
+              <a:buChar char="–"/>
+              <a:defRPr sz="2800" kern="1200">
+                <a:solidFill>
+                  <a:schemeClr val="tx1"/>
+                </a:solidFill>
+                <a:latin typeface="+mn-lt"/>
+                <a:ea typeface="+mn-ea"/>
+                <a:cs typeface="+mn-cs"/>
+              </a:defRPr>
+            </a:lvl2pPr>
+            <a:lvl3pPr marL="1143000" indent="-228600" algn="l" defTabSz="914400" rtl="0" eaLnBrk="1" latinLnBrk="0" hangingPunct="1">
+              <a:spcBef>
+                <a:spcPct val="20000"/>
+              </a:spcBef>
+              <a:buFont typeface="Arial" panose="020B0604020202020204" pitchFamily="34" charset="0"/>
+              <a:buChar char="•"/>
+              <a:defRPr sz="2400" kern="1200">
+                <a:solidFill>
+                  <a:schemeClr val="tx1"/>
+                </a:solidFill>
+                <a:latin typeface="+mn-lt"/>
+                <a:ea typeface="+mn-ea"/>
+                <a:cs typeface="+mn-cs"/>
+              </a:defRPr>
+            </a:lvl3pPr>
+            <a:lvl4pPr marL="1600200" indent="-228600" algn="l" defTabSz="914400" rtl="0" eaLnBrk="1" latinLnBrk="0" hangingPunct="1">
+              <a:spcBef>
+                <a:spcPct val="20000"/>
+              </a:spcBef>
+              <a:buFont typeface="Arial" panose="020B0604020202020204" pitchFamily="34" charset="0"/>
+              <a:buChar char="–"/>
+              <a:defRPr sz="2000" kern="1200">
+                <a:solidFill>
+                  <a:schemeClr val="tx1"/>
+                </a:solidFill>
+                <a:latin typeface="+mn-lt"/>
+                <a:ea typeface="+mn-ea"/>
+                <a:cs typeface="+mn-cs"/>
+              </a:defRPr>
+            </a:lvl4pPr>
+            <a:lvl5pPr marL="2057400" indent="-228600" algn="l" defTabSz="914400" rtl="0" eaLnBrk="1" latinLnBrk="0" hangingPunct="1">
+              <a:spcBef>
+                <a:spcPct val="20000"/>
+              </a:spcBef>
+              <a:buFont typeface="Arial" panose="020B0604020202020204" pitchFamily="34" charset="0"/>
+              <a:buChar char="»"/>
+              <a:defRPr sz="2000" kern="1200">
+                <a:solidFill>
+                  <a:schemeClr val="tx1"/>
+                </a:solidFill>
+                <a:latin typeface="+mn-lt"/>
+                <a:ea typeface="+mn-ea"/>
+                <a:cs typeface="+mn-cs"/>
+              </a:defRPr>
+            </a:lvl5pPr>
+            <a:lvl6pPr marL="2514600" indent="-228600" algn="l" defTabSz="914400" rtl="0" eaLnBrk="1" latinLnBrk="0" hangingPunct="1">
+              <a:spcBef>
+                <a:spcPct val="20000"/>
+              </a:spcBef>
+              <a:buFont typeface="Arial" panose="020B0604020202020204" pitchFamily="34" charset="0"/>
+              <a:buChar char="•"/>
+              <a:defRPr sz="2000" kern="1200">
+                <a:solidFill>
+                  <a:schemeClr val="tx1"/>
+                </a:solidFill>
+                <a:latin typeface="+mn-lt"/>
+                <a:ea typeface="+mn-ea"/>
+                <a:cs typeface="+mn-cs"/>
+              </a:defRPr>
+            </a:lvl6pPr>
+            <a:lvl7pPr marL="2971800" indent="-228600" algn="l" defTabSz="914400" rtl="0" eaLnBrk="1" latinLnBrk="0" hangingPunct="1">
+              <a:spcBef>
+                <a:spcPct val="20000"/>
+              </a:spcBef>
+              <a:buFont typeface="Arial" panose="020B0604020202020204" pitchFamily="34" charset="0"/>
+              <a:buChar char="•"/>
+              <a:defRPr sz="2000" kern="1200">
+                <a:solidFill>
+                  <a:schemeClr val="tx1"/>
+                </a:solidFill>
+                <a:latin typeface="+mn-lt"/>
+                <a:ea typeface="+mn-ea"/>
+                <a:cs typeface="+mn-cs"/>
+              </a:defRPr>
+            </a:lvl7pPr>
+            <a:lvl8pPr marL="3429000" indent="-228600" algn="l" defTabSz="914400" rtl="0" eaLnBrk="1" latinLnBrk="0" hangingPunct="1">
+              <a:spcBef>
+                <a:spcPct val="20000"/>
+              </a:spcBef>
+              <a:buFont typeface="Arial" panose="020B0604020202020204" pitchFamily="34" charset="0"/>
+              <a:buChar char="•"/>
+              <a:defRPr sz="2000" kern="1200">
+                <a:solidFill>
+                  <a:schemeClr val="tx1"/>
+                </a:solidFill>
+                <a:latin typeface="+mn-lt"/>
+                <a:ea typeface="+mn-ea"/>
+                <a:cs typeface="+mn-cs"/>
+              </a:defRPr>
+            </a:lvl8pPr>
+            <a:lvl9pPr marL="3886200" indent="-228600" algn="l" defTabSz="914400" rtl="0" eaLnBrk="1" latinLnBrk="0" hangingPunct="1">
+              <a:spcBef>
+                <a:spcPct val="20000"/>
+              </a:spcBef>
+              <a:buFont typeface="Arial" panose="020B0604020202020204" pitchFamily="34" charset="0"/>
+              <a:buChar char="•"/>
+              <a:defRPr sz="2000" kern="1200">
+                <a:solidFill>
+                  <a:schemeClr val="tx1"/>
+                </a:solidFill>
+                <a:latin typeface="+mn-lt"/>
+                <a:ea typeface="+mn-ea"/>
+                <a:cs typeface="+mn-cs"/>
+              </a:defRPr>
+            </a:lvl9pPr>
+          </a:lstStyle>
+          <a:p>
+            <a:r>
+              <a:rPr lang="en-US" sz="2400" dirty="0" smtClean="0"/>
+              <a:t>CV options for variability:</a:t>
+            </a:r>
+          </a:p>
+          <a:p>
+            <a:pPr marL="0" indent="0">
+              <a:buNone/>
+            </a:pPr>
+            <a:r>
+              <a:rPr lang="en-US" sz="2000" dirty="0" smtClean="0">
+                <a:latin typeface="Courier New" panose="02070309020205020404" pitchFamily="49" charset="0"/>
+                <a:cs typeface="Courier New" panose="02070309020205020404" pitchFamily="49" charset="0"/>
+              </a:rPr>
+              <a:t>1 #_</a:t>
+            </a:r>
+            <a:r>
+              <a:rPr lang="en-US" sz="2000" dirty="0" err="1" smtClean="0">
+                <a:latin typeface="Courier New" panose="02070309020205020404" pitchFamily="49" charset="0"/>
+                <a:cs typeface="Courier New" panose="02070309020205020404" pitchFamily="49" charset="0"/>
+              </a:rPr>
+              <a:t>CV_Growth_Pattern</a:t>
+            </a:r>
+            <a:r>
+              <a:rPr lang="en-US" sz="2000" dirty="0" smtClean="0">
+                <a:latin typeface="Courier New" panose="02070309020205020404" pitchFamily="49" charset="0"/>
+                <a:cs typeface="Courier New" panose="02070309020205020404" pitchFamily="49" charset="0"/>
+              </a:rPr>
+              <a:t>:  0 CV=f(LAA); 1 CV=F(A); 2 SD=F(LAA); 3 SD=F(A); 4 </a:t>
+            </a:r>
+            <a:r>
+              <a:rPr lang="en-US" sz="2000" dirty="0" err="1" smtClean="0">
+                <a:latin typeface="Courier New" panose="02070309020205020404" pitchFamily="49" charset="0"/>
+                <a:cs typeface="Courier New" panose="02070309020205020404" pitchFamily="49" charset="0"/>
+              </a:rPr>
+              <a:t>logSD</a:t>
+            </a:r>
+            <a:r>
+              <a:rPr lang="en-US" sz="2000" dirty="0" smtClean="0">
+                <a:latin typeface="Courier New" panose="02070309020205020404" pitchFamily="49" charset="0"/>
+                <a:cs typeface="Courier New" panose="02070309020205020404" pitchFamily="49" charset="0"/>
+              </a:rPr>
+              <a:t>=F(A)</a:t>
+            </a:r>
+            <a:endParaRPr lang="en-US" sz="2400" dirty="0" smtClean="0">
+              <a:latin typeface="Courier New" panose="02070309020205020404" pitchFamily="49" charset="0"/>
+              <a:cs typeface="Courier New" panose="02070309020205020404" pitchFamily="49" charset="0"/>
+            </a:endParaRPr>
+          </a:p>
+        </p:txBody>
+      </p:sp>
+      <p:cxnSp>
+        <p:nvCxnSpPr>
+          <p:cNvPr id="6" name="Straight Arrow Connector 5"/>
+          <p:cNvCxnSpPr/>
+          <p:nvPr/>
+        </p:nvCxnSpPr>
+        <p:spPr>
+          <a:xfrm flipV="1">
+            <a:off x="838200" y="2438400"/>
+            <a:ext cx="0" cy="3429000"/>
+          </a:xfrm>
+          <a:prstGeom prst="straightConnector1">
+            <a:avLst/>
+          </a:prstGeom>
+          <a:ln w="38100">
+            <a:solidFill>
+              <a:srgbClr val="C00000"/>
+            </a:solidFill>
+            <a:tailEnd type="arrow"/>
+          </a:ln>
+        </p:spPr>
+        <p:style>
+          <a:lnRef idx="1">
+            <a:schemeClr val="accent1"/>
+          </a:lnRef>
+          <a:fillRef idx="0">
+            <a:schemeClr val="accent1"/>
+          </a:fillRef>
+          <a:effectRef idx="0">
+            <a:schemeClr val="accent1"/>
+          </a:effectRef>
+          <a:fontRef idx="minor">
+            <a:schemeClr val="tx1"/>
+          </a:fontRef>
+        </p:style>
+      </p:cxnSp>
+      <p:sp>
+        <p:nvSpPr>
+          <p:cNvPr id="10" name="TextBox 9"/>
+          <p:cNvSpPr txBox="1"/>
+          <p:nvPr/>
+        </p:nvSpPr>
+        <p:spPr>
+          <a:xfrm rot="16200000">
+            <a:off x="-719668" y="3968234"/>
+            <a:ext cx="2702022" cy="369332"/>
+          </a:xfrm>
+          <a:prstGeom prst="rect">
+            <a:avLst/>
+          </a:prstGeom>
+          <a:noFill/>
+        </p:spPr>
+        <p:txBody>
+          <a:bodyPr wrap="none" rtlCol="0">
+            <a:spAutoFit/>
+          </a:bodyPr>
+          <a:lstStyle/>
+          <a:p>
+            <a:r>
+              <a:rPr lang="en-US" b="1" dirty="0" smtClean="0">
+                <a:solidFill>
+                  <a:srgbClr val="C00000"/>
+                </a:solidFill>
+              </a:rPr>
+              <a:t>Can be CV or SD of growth</a:t>
+            </a:r>
+            <a:endParaRPr lang="en-US" b="1" dirty="0">
+              <a:solidFill>
+                <a:srgbClr val="C00000"/>
+              </a:solidFill>
+            </a:endParaRPr>
+          </a:p>
+        </p:txBody>
+      </p:sp>
+      <p:cxnSp>
+        <p:nvCxnSpPr>
+          <p:cNvPr id="11" name="Straight Arrow Connector 10"/>
+          <p:cNvCxnSpPr/>
+          <p:nvPr/>
+        </p:nvCxnSpPr>
+        <p:spPr>
+          <a:xfrm>
+            <a:off x="1828800" y="6477000"/>
+            <a:ext cx="4953000" cy="0"/>
+          </a:xfrm>
+          <a:prstGeom prst="straightConnector1">
+            <a:avLst/>
+          </a:prstGeom>
+          <a:ln w="38100">
+            <a:solidFill>
+              <a:srgbClr val="C00000"/>
+            </a:solidFill>
+            <a:tailEnd type="arrow"/>
+          </a:ln>
+        </p:spPr>
+        <p:style>
+          <a:lnRef idx="1">
+            <a:schemeClr val="accent1"/>
+          </a:lnRef>
+          <a:fillRef idx="0">
+            <a:schemeClr val="accent1"/>
+          </a:fillRef>
+          <a:effectRef idx="0">
+            <a:schemeClr val="accent1"/>
+          </a:effectRef>
+          <a:fontRef idx="minor">
+            <a:schemeClr val="tx1"/>
+          </a:fontRef>
+        </p:style>
+      </p:cxnSp>
+      <p:sp>
+        <p:nvSpPr>
+          <p:cNvPr id="12" name="TextBox 11"/>
+          <p:cNvSpPr txBox="1"/>
+          <p:nvPr/>
+        </p:nvSpPr>
+        <p:spPr>
+          <a:xfrm>
+            <a:off x="2514600" y="6019800"/>
+            <a:ext cx="2140971" cy="369332"/>
+          </a:xfrm>
+          <a:prstGeom prst="rect">
+            <a:avLst/>
+          </a:prstGeom>
+          <a:noFill/>
+        </p:spPr>
+        <p:txBody>
+          <a:bodyPr wrap="none" rtlCol="0">
+            <a:spAutoFit/>
+          </a:bodyPr>
+          <a:lstStyle/>
+          <a:p>
+            <a:r>
+              <a:rPr lang="en-US" b="1" dirty="0" smtClean="0">
+                <a:solidFill>
+                  <a:srgbClr val="C00000"/>
+                </a:solidFill>
+              </a:rPr>
+              <a:t>Can be age or length</a:t>
+            </a:r>
+            <a:endParaRPr lang="en-US" b="1" dirty="0">
+              <a:solidFill>
+                <a:srgbClr val="C00000"/>
+              </a:solidFill>
+            </a:endParaRPr>
+          </a:p>
+        </p:txBody>
+      </p:sp>
+      <p:sp>
+        <p:nvSpPr>
+          <p:cNvPr id="15" name="Title 14"/>
+          <p:cNvSpPr>
+            <a:spLocks noGrp="1"/>
+          </p:cNvSpPr>
+          <p:nvPr>
+            <p:ph type="title"/>
+          </p:nvPr>
+        </p:nvSpPr>
+        <p:spPr/>
+        <p:txBody>
+          <a:bodyPr/>
+          <a:lstStyle/>
+          <a:p>
+            <a:r>
+              <a:rPr lang="en-US" dirty="0" smtClean="0"/>
+              <a:t>Parameterization of growth: length variability</a:t>
+            </a:r>
+            <a:endParaRPr lang="en-US" dirty="0"/>
+          </a:p>
+        </p:txBody>
+      </p:sp>
+    </p:spTree>
+    <p:extLst>
+      <p:ext uri="{BB962C8B-B14F-4D97-AF65-F5344CB8AC3E}">
+        <p14:creationId xmlns:p14="http://schemas.microsoft.com/office/powerpoint/2010/main" val="869017399"/>
       </p:ext>
     </p:extLst>
   </p:cSld>

</xml_diff>

<commit_message>
added Methot and Wetzel appendix, update to PPT
</commit_message>
<xml_diff>
--- a/Modeling growth in SS.pptx
+++ b/Modeling growth in SS.pptx
@@ -5792,7 +5792,15 @@
                   <a:schemeClr val="tx2"/>
                 </a:solidFill>
               </a:rPr>
-              <a:t>(not </a:t>
+              <a:t>(not to be used for estimation so use -</a:t>
+            </a:r>
+            <a:r>
+              <a:rPr lang="en-US" dirty="0" err="1" smtClean="0">
+                <a:solidFill>
+                  <a:schemeClr val="tx2"/>
+                </a:solidFill>
+              </a:rPr>
+              <a:t>nohess</a:t>
             </a:r>
             <a:r>
               <a:rPr lang="en-US" dirty="0" smtClean="0">
@@ -5800,45 +5808,16 @@
                   <a:schemeClr val="tx2"/>
                 </a:solidFill>
               </a:rPr>
-              <a:t>to be used for </a:t>
-            </a:r>
-            <a:r>
-              <a:rPr lang="en-US" dirty="0" smtClean="0">
+              <a:t>)</a:t>
+            </a:r>
+            <a:r>
+              <a:rPr lang="en-US" b="1" dirty="0" smtClean="0">
                 <a:solidFill>
                   <a:schemeClr val="tx2"/>
                 </a:solidFill>
               </a:rPr>
-              <a:t>estimation so use -</a:t>
-            </a:r>
-            <a:r>
-              <a:rPr lang="en-US" dirty="0" err="1" smtClean="0">
-                <a:solidFill>
-                  <a:schemeClr val="tx2"/>
-                </a:solidFill>
-              </a:rPr>
-              <a:t>nohess</a:t>
-            </a:r>
-            <a:r>
-              <a:rPr lang="en-US" dirty="0" smtClean="0">
-                <a:solidFill>
-                  <a:schemeClr val="tx2"/>
-                </a:solidFill>
-              </a:rPr>
-              <a:t>)</a:t>
-            </a:r>
-            <a:r>
-              <a:rPr lang="en-US" b="1" dirty="0" smtClean="0">
-                <a:solidFill>
-                  <a:schemeClr val="tx2"/>
-                </a:solidFill>
-              </a:rPr>
               <a:t>:</a:t>
             </a:r>
-            <a:endParaRPr lang="en-US" b="1" dirty="0" smtClean="0">
-              <a:solidFill>
-                <a:schemeClr val="tx2"/>
-              </a:solidFill>
-            </a:endParaRPr>
           </a:p>
           <a:p>
             <a:r>
@@ -5881,21 +5860,8 @@
                   <a:schemeClr val="tx2"/>
                 </a:solidFill>
               </a:rPr>
-              <a:t>Models for illustrating conditional and marginal age </a:t>
-            </a:r>
-            <a:r>
-              <a:rPr lang="en-US" b="1" dirty="0" smtClean="0">
-                <a:solidFill>
-                  <a:schemeClr val="tx2"/>
-                </a:solidFill>
-              </a:rPr>
-              <a:t>compositions:</a:t>
-            </a:r>
-            <a:endParaRPr lang="en-US" b="1" dirty="0" smtClean="0">
-              <a:solidFill>
-                <a:schemeClr val="tx2"/>
-              </a:solidFill>
-            </a:endParaRPr>
+              <a:t>Models for illustrating conditional and marginal age compositions:</a:t>
+            </a:r>
           </a:p>
           <a:p>
             <a:r>
@@ -6031,15 +5997,7 @@
             </a:pPr>
             <a:r>
               <a:rPr lang="en-US" sz="3200" dirty="0" smtClean="0"/>
-              <a:t>All length and age observations may be associated </a:t>
-            </a:r>
-            <a:r>
-              <a:rPr lang="en-US" sz="3200" dirty="0" smtClean="0"/>
-              <a:t>with</a:t>
-            </a:r>
-            <a:r>
-              <a:rPr lang="en-US" sz="3200" dirty="0" smtClean="0"/>
-              <a:t/>
+              <a:t>All length and age observations may be associated with</a:t>
             </a:r>
             <a:br>
               <a:rPr lang="en-US" sz="3200" dirty="0" smtClean="0"/>
@@ -6077,15 +6035,7 @@
             </a:pPr>
             <a:r>
               <a:rPr lang="en-US" sz="3200" dirty="0" smtClean="0"/>
-              <a:t>Also </a:t>
-            </a:r>
-            <a:r>
-              <a:rPr lang="en-US" sz="3200" dirty="0" smtClean="0"/>
-              <a:t>associated with either</a:t>
-            </a:r>
-            <a:r>
-              <a:rPr lang="en-US" sz="3200" dirty="0" smtClean="0"/>
-              <a:t/>
+              <a:t>Also associated with either</a:t>
             </a:r>
             <a:br>
               <a:rPr lang="en-US" sz="3200" dirty="0" smtClean="0"/>
@@ -6540,7 +6490,6 @@
               <a:rPr lang="en-US" sz="2000" dirty="0" smtClean="0"/>
               <a:t>topics</a:t>
             </a:r>
-            <a:endParaRPr lang="en-US" sz="2000" dirty="0"/>
           </a:p>
           <a:p>
             <a:pPr lvl="1"/>
@@ -6560,11 +6509,7 @@
             <a:pPr lvl="1"/>
             <a:r>
               <a:rPr lang="en-US" sz="2000" dirty="0" smtClean="0"/>
-              <a:t>Time-varying </a:t>
-            </a:r>
-            <a:r>
-              <a:rPr lang="en-US" sz="2000" dirty="0"/>
-              <a:t>growth</a:t>
+              <a:t>Time-varying growth</a:t>
             </a:r>
           </a:p>
           <a:p>
@@ -10657,13 +10602,23 @@
         </p:spPr>
         <p:txBody>
           <a:bodyPr>
-            <a:normAutofit/>
+            <a:normAutofit lnSpcReduction="10000"/>
           </a:bodyPr>
           <a:lstStyle/>
           <a:p>
             <a:r>
               <a:rPr lang="en-US" dirty="0" smtClean="0"/>
-              <a:t>More SS materials at this </a:t>
+              <a:t>Presentation is more diagrams than equations</a:t>
+            </a:r>
+          </a:p>
+          <a:p>
+            <a:r>
+              <a:rPr lang="en-US" dirty="0" smtClean="0"/>
+              <a:t>More </a:t>
+            </a:r>
+            <a:r>
+              <a:rPr lang="en-US" dirty="0" smtClean="0"/>
+              <a:t>SS materials at this </a:t>
             </a:r>
             <a:r>
               <a:rPr lang="en-US" dirty="0" smtClean="0">
@@ -10677,10 +10632,6 @@
             <a:r>
               <a:rPr lang="en-US" dirty="0" smtClean="0"/>
               <a:t>Content for this tutorial at</a:t>
-            </a:r>
-            <a:r>
-              <a:rPr lang="en-US" dirty="0" smtClean="0"/>
-              <a:t/>
             </a:r>
             <a:br>
               <a:rPr lang="en-US" dirty="0" smtClean="0"/>
@@ -10774,11 +10725,7 @@
           <a:p>
             <a:r>
               <a:rPr lang="en-US" dirty="0" smtClean="0"/>
-              <a:t>Example models referenced at bottom of </a:t>
-            </a:r>
-            <a:r>
-              <a:rPr lang="en-US" dirty="0" smtClean="0"/>
-              <a:t>slides</a:t>
+              <a:t>Example models referenced at bottom of slides</a:t>
             </a:r>
           </a:p>
           <a:p>
@@ -11388,11 +11335,7 @@
           <a:p>
             <a:r>
               <a:rPr lang="en-US" dirty="0" smtClean="0"/>
-              <a:t>More exciting </a:t>
-            </a:r>
-            <a:r>
-              <a:rPr lang="en-US" dirty="0" smtClean="0"/>
-              <a:t>info</a:t>
+              <a:t>More exciting info</a:t>
             </a:r>
             <a:br>
               <a:rPr lang="en-US" dirty="0" smtClean="0"/>
@@ -11403,15 +11346,7 @@
                   <a:srgbClr val="C00000"/>
                 </a:solidFill>
               </a:rPr>
-              <a:t>8am </a:t>
-            </a:r>
-            <a:r>
-              <a:rPr lang="en-US" dirty="0" smtClean="0">
-                <a:solidFill>
-                  <a:srgbClr val="C00000"/>
-                </a:solidFill>
-              </a:rPr>
-              <a:t>Friday morning</a:t>
+              <a:t>8am Friday morning</a:t>
             </a:r>
           </a:p>
         </p:txBody>
@@ -11779,15 +11714,7 @@
                   <a:srgbClr val="C00000"/>
                 </a:solidFill>
               </a:rPr>
-              <a:t>Informative age </a:t>
-            </a:r>
-            <a:r>
-              <a:rPr lang="en-US" dirty="0" smtClean="0">
-                <a:solidFill>
-                  <a:srgbClr val="C00000"/>
-                </a:solidFill>
-              </a:rPr>
-              <a:t>data.</a:t>
+              <a:t>Informative age data.</a:t>
             </a:r>
           </a:p>
           <a:p>
@@ -11800,15 +11727,7 @@
                   <a:srgbClr val="C00000"/>
                 </a:solidFill>
               </a:rPr>
-              <a:t>Weights needed to </a:t>
-            </a:r>
-            <a:r>
-              <a:rPr lang="en-US" dirty="0" smtClean="0">
-                <a:solidFill>
-                  <a:srgbClr val="C00000"/>
-                </a:solidFill>
-              </a:rPr>
-              <a:t>convert total catch to numbers at age removed</a:t>
+              <a:t>Weights needed to convert total catch to numbers at age removed</a:t>
             </a:r>
             <a:endParaRPr lang="en-US" dirty="0">
               <a:solidFill>
@@ -11988,11 +11907,7 @@
           <a:p>
             <a:r>
               <a:rPr lang="en-US" dirty="0" smtClean="0"/>
-              <a:t>Example model: hake, </a:t>
-            </a:r>
-            <a:r>
-              <a:rPr lang="en-US" dirty="0" smtClean="0"/>
-              <a:t>new data weighting info</a:t>
+              <a:t>Example model: hake, new data weighting info</a:t>
             </a:r>
             <a:endParaRPr lang="en-US" dirty="0"/>
           </a:p>
@@ -12472,25 +12387,53 @@
           <a:p>
             <a:r>
               <a:rPr lang="en-US" dirty="0" smtClean="0"/>
-              <a:t>Beginning of year vs. mid-year values</a:t>
-            </a:r>
-          </a:p>
-          <a:p>
+              <a:t>beginning </a:t>
+            </a:r>
             <a:r>
               <a:rPr lang="en-US" dirty="0" smtClean="0"/>
-              <a:t>Seasonal models</a:t>
-            </a:r>
-          </a:p>
-          <a:p>
+              <a:t>of year vs. mid-year values</a:t>
+            </a:r>
+          </a:p>
+          <a:p>
+            <a:r>
+              <a:rPr lang="en-US" dirty="0"/>
+              <a:t>s</a:t>
+            </a:r>
             <a:r>
               <a:rPr lang="en-US" dirty="0" smtClean="0"/>
-              <a:t>Birth season</a:t>
-            </a:r>
-          </a:p>
-          <a:p>
+              <a:t>easonal </a:t>
+            </a:r>
             <a:r>
               <a:rPr lang="en-US" dirty="0" smtClean="0"/>
-              <a:t>Fleet timing </a:t>
+              <a:t>models</a:t>
+            </a:r>
+          </a:p>
+          <a:p>
+            <a:r>
+              <a:rPr lang="en-US" dirty="0"/>
+              <a:t>b</a:t>
+            </a:r>
+            <a:r>
+              <a:rPr lang="en-US" dirty="0" smtClean="0"/>
+              <a:t>irth </a:t>
+            </a:r>
+            <a:r>
+              <a:rPr lang="en-US" dirty="0" smtClean="0"/>
+              <a:t>season</a:t>
+            </a:r>
+          </a:p>
+          <a:p>
+            <a:r>
+              <a:rPr lang="en-US" dirty="0"/>
+              <a:t>f</a:t>
+            </a:r>
+            <a:r>
+              <a:rPr lang="en-US" dirty="0" smtClean="0"/>
+              <a:t>leet </a:t>
+            </a:r>
+            <a:r>
+              <a:rPr lang="en-US" dirty="0" smtClean="0"/>
+              <a:t>timing </a:t>
             </a:r>
             <a:br>
               <a:rPr lang="en-US" dirty="0" smtClean="0"/>
@@ -12501,25 +12444,56 @@
             </a:r>
           </a:p>
           <a:p>
-            <a:pPr marL="0" indent="0">
+            <a:pPr marL="0" indent="0" algn="ctr">
               <a:buNone/>
             </a:pPr>
             <a:r>
+              <a:rPr lang="en-US" i="1" dirty="0" smtClean="0">
+                <a:solidFill>
+                  <a:srgbClr val="FF0000"/>
+                </a:solidFill>
+              </a:rPr>
+              <a:t>All this is changing in SS version 3.3</a:t>
+            </a:r>
+          </a:p>
+          <a:p>
+            <a:r>
+              <a:rPr lang="en-US" dirty="0"/>
+              <a:t>o</a:t>
+            </a:r>
+            <a:r>
               <a:rPr lang="en-US" dirty="0" smtClean="0"/>
-              <a:t>All this is changing in SS version 3.3</a:t>
-            </a:r>
-          </a:p>
-          <a:p>
+              <a:t>bservations </a:t>
+            </a:r>
             <a:r>
               <a:rPr lang="en-US" dirty="0" smtClean="0"/>
-              <a:t>Observations will be associated with month</a:t>
-            </a:r>
-          </a:p>
-          <a:p>
+              <a:t>will be associated with month</a:t>
+            </a:r>
+          </a:p>
+          <a:p>
+            <a:r>
+              <a:rPr lang="en-US" dirty="0"/>
+              <a:t>s</a:t>
+            </a:r>
             <a:r>
               <a:rPr lang="en-US" dirty="0" smtClean="0"/>
-              <a:t>Settlement time replaces birth season</a:t>
-            </a:r>
+              <a:t>ettlement </a:t>
+            </a:r>
+            <a:r>
+              <a:rPr lang="en-US" dirty="0" smtClean="0"/>
+              <a:t>time replaces birth </a:t>
+            </a:r>
+            <a:r>
+              <a:rPr lang="en-US" dirty="0" smtClean="0"/>
+              <a:t>season</a:t>
+            </a:r>
+          </a:p>
+          <a:p>
+            <a:r>
+              <a:rPr lang="en-US" dirty="0" smtClean="0"/>
+              <a:t>ask Rick Methot about the future</a:t>
+            </a:r>
+            <a:endParaRPr lang="en-US" dirty="0" smtClean="0"/>
           </a:p>
           <a:p>
             <a:endParaRPr lang="en-US" dirty="0"/>
@@ -12605,7 +12579,6 @@
               <a:rPr lang="en-US" dirty="0"/>
               <a:t>Quantities that depend on growth and how they are connected</a:t>
             </a:r>
-            <a:endParaRPr lang="en-US" dirty="0"/>
           </a:p>
         </p:txBody>
       </p:sp>
@@ -12681,10 +12654,49 @@
         </p:nvSpPr>
         <p:spPr/>
         <p:txBody>
-          <a:bodyPr/>
-          <a:lstStyle/>
-          <a:p>
+          <a:bodyPr>
+            <a:normAutofit/>
+          </a:bodyPr>
+          <a:lstStyle/>
+          <a:p>
+            <a:r>
+              <a:rPr lang="en-US" dirty="0" smtClean="0"/>
+              <a:t>What depends on what</a:t>
+            </a:r>
             <a:endParaRPr lang="en-US" dirty="0"/>
+          </a:p>
+        </p:txBody>
+      </p:sp>
+      <p:sp>
+        <p:nvSpPr>
+          <p:cNvPr id="3" name="Content Placeholder 2"/>
+          <p:cNvSpPr>
+            <a:spLocks noGrp="1"/>
+          </p:cNvSpPr>
+          <p:nvPr>
+            <p:ph idx="1"/>
+          </p:nvPr>
+        </p:nvSpPr>
+        <p:spPr>
+          <a:xfrm>
+            <a:off x="457200" y="609600"/>
+            <a:ext cx="8229600" cy="5211763"/>
+          </a:xfrm>
+        </p:spPr>
+        <p:txBody>
+          <a:bodyPr>
+            <a:normAutofit/>
+          </a:bodyPr>
+          <a:lstStyle/>
+          <a:p>
+            <a:pPr marL="0" indent="0">
+              <a:buNone/>
+            </a:pPr>
+            <a:r>
+              <a:rPr lang="en-US" sz="2400" dirty="0" smtClean="0"/>
+              <a:t>see Methot and Wetzel 2013 tech doc for details</a:t>
+            </a:r>
+            <a:endParaRPr lang="en-US" sz="2400" dirty="0"/>
           </a:p>
         </p:txBody>
       </p:sp>
@@ -12914,13 +12926,6 @@
               </a:rPr>
               <a:t>$ALK</a:t>
             </a:r>
-            <a:endParaRPr lang="en-US" dirty="0">
-              <a:solidFill>
-                <a:schemeClr val="accent3">
-                  <a:lumMod val="50000"/>
-                </a:schemeClr>
-              </a:solidFill>
-            </a:endParaRPr>
           </a:p>
         </p:txBody>
       </p:sp>
@@ -13111,6 +13116,260 @@
           </a:fontRef>
         </p:style>
       </p:cxnSp>
+      <p:sp>
+        <p:nvSpPr>
+          <p:cNvPr id="10" name="TextBox 9"/>
+          <p:cNvSpPr txBox="1"/>
+          <p:nvPr/>
+        </p:nvSpPr>
+        <p:spPr>
+          <a:xfrm>
+            <a:off x="3733800" y="4343398"/>
+            <a:ext cx="2596416" cy="923330"/>
+          </a:xfrm>
+          <a:prstGeom prst="rect">
+            <a:avLst/>
+          </a:prstGeom>
+          <a:solidFill>
+            <a:schemeClr val="tx2">
+              <a:lumMod val="20000"/>
+              <a:lumOff val="80000"/>
+            </a:schemeClr>
+          </a:solidFill>
+        </p:spPr>
+        <p:style>
+          <a:lnRef idx="2">
+            <a:schemeClr val="accent1"/>
+          </a:lnRef>
+          <a:fillRef idx="1">
+            <a:schemeClr val="lt1"/>
+          </a:fillRef>
+          <a:effectRef idx="0">
+            <a:schemeClr val="accent1"/>
+          </a:effectRef>
+          <a:fontRef idx="minor">
+            <a:schemeClr val="dk1"/>
+          </a:fontRef>
+        </p:style>
+        <p:txBody>
+          <a:bodyPr wrap="none" rtlCol="0">
+            <a:spAutoFit/>
+          </a:bodyPr>
+          <a:lstStyle/>
+          <a:p>
+            <a:r>
+              <a:rPr lang="en-US" dirty="0" smtClean="0"/>
+              <a:t>Apply selectivity at length</a:t>
+            </a:r>
+            <a:endParaRPr lang="en-US" dirty="0" smtClean="0"/>
+          </a:p>
+          <a:p>
+            <a:r>
+              <a:rPr lang="en-US" dirty="0"/>
+              <a:t>“</a:t>
+            </a:r>
+            <a:r>
+              <a:rPr lang="en-US" dirty="0">
+                <a:solidFill>
+                  <a:schemeClr val="accent6">
+                    <a:lumMod val="50000"/>
+                  </a:schemeClr>
+                </a:solidFill>
+              </a:rPr>
+              <a:t>AGE_LENGTH_KEY”</a:t>
+            </a:r>
+          </a:p>
+          <a:p>
+            <a:r>
+              <a:rPr lang="en-US" dirty="0">
+                <a:solidFill>
+                  <a:schemeClr val="accent3">
+                    <a:lumMod val="50000"/>
+                  </a:schemeClr>
+                </a:solidFill>
+              </a:rPr>
+              <a:t>$ALK</a:t>
+            </a:r>
+          </a:p>
+        </p:txBody>
+      </p:sp>
+      <p:sp>
+        <p:nvSpPr>
+          <p:cNvPr id="6" name="TextBox 5"/>
+          <p:cNvSpPr txBox="1"/>
+          <p:nvPr/>
+        </p:nvSpPr>
+        <p:spPr>
+          <a:xfrm>
+            <a:off x="3581400" y="1524000"/>
+            <a:ext cx="2280176" cy="369332"/>
+          </a:xfrm>
+          <a:prstGeom prst="rect">
+            <a:avLst/>
+          </a:prstGeom>
+          <a:noFill/>
+        </p:spPr>
+        <p:txBody>
+          <a:bodyPr wrap="none" rtlCol="0">
+            <a:spAutoFit/>
+          </a:bodyPr>
+          <a:lstStyle>
+            <a:defPPr>
+              <a:defRPr lang="en-US"/>
+            </a:defPPr>
+            <a:lvl1pPr>
+              <a:defRPr>
+                <a:solidFill>
+                  <a:schemeClr val="accent6">
+                    <a:lumMod val="50000"/>
+                  </a:schemeClr>
+                </a:solidFill>
+              </a:defRPr>
+            </a:lvl1pPr>
+          </a:lstStyle>
+          <a:p>
+            <a:r>
+              <a:rPr lang="en-US" dirty="0"/>
+              <a:t>Keyword in </a:t>
+            </a:r>
+            <a:r>
+              <a:rPr lang="en-US" dirty="0" err="1"/>
+              <a:t>Report.sso</a:t>
+            </a:r>
+            <a:endParaRPr lang="en-US" dirty="0"/>
+          </a:p>
+        </p:txBody>
+      </p:sp>
+      <p:sp>
+        <p:nvSpPr>
+          <p:cNvPr id="14" name="TextBox 13"/>
+          <p:cNvSpPr txBox="1"/>
+          <p:nvPr/>
+        </p:nvSpPr>
+        <p:spPr>
+          <a:xfrm>
+            <a:off x="3581400" y="2053114"/>
+            <a:ext cx="4252446" cy="369332"/>
+          </a:xfrm>
+          <a:prstGeom prst="rect">
+            <a:avLst/>
+          </a:prstGeom>
+          <a:noFill/>
+        </p:spPr>
+        <p:txBody>
+          <a:bodyPr wrap="none" rtlCol="0">
+            <a:spAutoFit/>
+          </a:bodyPr>
+          <a:lstStyle/>
+          <a:p>
+            <a:r>
+              <a:rPr lang="en-US" dirty="0" smtClean="0">
+                <a:solidFill>
+                  <a:schemeClr val="accent3">
+                    <a:lumMod val="50000"/>
+                  </a:schemeClr>
+                </a:solidFill>
+              </a:rPr>
+              <a:t>element of list in r4ss created by </a:t>
+            </a:r>
+            <a:r>
+              <a:rPr lang="en-US" dirty="0" err="1" smtClean="0">
+                <a:solidFill>
+                  <a:schemeClr val="accent3">
+                    <a:lumMod val="50000"/>
+                  </a:schemeClr>
+                </a:solidFill>
+              </a:rPr>
+              <a:t>SS_output</a:t>
+            </a:r>
+            <a:endParaRPr lang="en-US" dirty="0">
+              <a:solidFill>
+                <a:schemeClr val="accent3">
+                  <a:lumMod val="50000"/>
+                </a:schemeClr>
+              </a:solidFill>
+            </a:endParaRPr>
+          </a:p>
+        </p:txBody>
+      </p:sp>
+      <p:cxnSp>
+        <p:nvCxnSpPr>
+          <p:cNvPr id="15" name="Straight Arrow Connector 14"/>
+          <p:cNvCxnSpPr>
+            <a:stCxn id="6" idx="1"/>
+          </p:cNvCxnSpPr>
+          <p:nvPr/>
+        </p:nvCxnSpPr>
+        <p:spPr>
+          <a:xfrm flipH="1">
+            <a:off x="2947913" y="1708666"/>
+            <a:ext cx="633487" cy="184666"/>
+          </a:xfrm>
+          <a:prstGeom prst="straightConnector1">
+            <a:avLst/>
+          </a:prstGeom>
+          <a:ln w="38100">
+            <a:solidFill>
+              <a:schemeClr val="accent6">
+                <a:lumMod val="50000"/>
+              </a:schemeClr>
+            </a:solidFill>
+            <a:tailEnd type="arrow"/>
+          </a:ln>
+        </p:spPr>
+        <p:style>
+          <a:lnRef idx="1">
+            <a:schemeClr val="accent1"/>
+          </a:lnRef>
+          <a:fillRef idx="0">
+            <a:schemeClr val="accent1"/>
+          </a:fillRef>
+          <a:effectRef idx="0">
+            <a:schemeClr val="accent1"/>
+          </a:effectRef>
+          <a:fontRef idx="minor">
+            <a:schemeClr val="tx1"/>
+          </a:fontRef>
+        </p:style>
+      </p:cxnSp>
+      <p:cxnSp>
+        <p:nvCxnSpPr>
+          <p:cNvPr id="17" name="Straight Arrow Connector 16"/>
+          <p:cNvCxnSpPr/>
+          <p:nvPr/>
+        </p:nvCxnSpPr>
+        <p:spPr>
+          <a:xfrm flipH="1">
+            <a:off x="2819401" y="2237780"/>
+            <a:ext cx="761999" cy="0"/>
+          </a:xfrm>
+          <a:prstGeom prst="straightConnector1">
+            <a:avLst/>
+          </a:prstGeom>
+          <a:ln w="38100">
+            <a:solidFill>
+              <a:schemeClr val="accent3">
+                <a:lumMod val="75000"/>
+              </a:schemeClr>
+            </a:solidFill>
+            <a:tailEnd type="arrow"/>
+          </a:ln>
+        </p:spPr>
+        <p:style>
+          <a:lnRef idx="1">
+            <a:schemeClr val="accent1"/>
+          </a:lnRef>
+          <a:fillRef idx="0">
+            <a:schemeClr val="accent1"/>
+          </a:fillRef>
+          <a:effectRef idx="0">
+            <a:schemeClr val="accent1"/>
+          </a:effectRef>
+          <a:fontRef idx="minor">
+            <a:schemeClr val="tx1"/>
+          </a:fontRef>
+        </p:style>
+      </p:cxnSp>
     </p:spTree>
     <p:extLst>
       <p:ext uri="{BB962C8B-B14F-4D97-AF65-F5344CB8AC3E}">
@@ -13735,17 +13994,7 @@
                   </a:schemeClr>
                 </a:solidFill>
               </a:rPr>
-              <a:t>ource model: </a:t>
-            </a:r>
-            <a:r>
-              <a:rPr lang="en-US" sz="1400" dirty="0" smtClean="0">
-                <a:solidFill>
-                  <a:schemeClr val="accent1">
-                    <a:lumMod val="75000"/>
-                  </a:schemeClr>
-                </a:solidFill>
-              </a:rPr>
-              <a:t>bigeye tuna model from Rishi Sharma (not in shared set)</a:t>
+              <a:t>ource model: bigeye tuna model from Rishi Sharma (not in shared set)</a:t>
             </a:r>
             <a:endParaRPr lang="en-US" sz="1400" dirty="0">
               <a:solidFill>
@@ -14378,11 +14627,7 @@
           <a:p>
             <a:r>
               <a:rPr lang="en-US" dirty="0" smtClean="0"/>
-              <a:t>Time-varying </a:t>
-            </a:r>
-            <a:r>
-              <a:rPr lang="en-US" dirty="0" smtClean="0"/>
-              <a:t>growth: annual effects</a:t>
+              <a:t>Time-varying growth: annual effects</a:t>
             </a:r>
             <a:endParaRPr lang="en-US" dirty="0"/>
           </a:p>
@@ -14469,17 +14714,7 @@
                   </a:schemeClr>
                 </a:solidFill>
               </a:rPr>
-              <a:t>source:  </a:t>
-            </a:r>
-            <a:r>
-              <a:rPr lang="en-US" sz="1400" dirty="0" smtClean="0">
-                <a:solidFill>
-                  <a:schemeClr val="accent1">
-                    <a:lumMod val="75000"/>
-                  </a:schemeClr>
-                </a:solidFill>
-              </a:rPr>
-              <a:t>User Manual for Stock Synthesis (v3.24s), page 91</a:t>
+              <a:t>source:  User Manual for Stock Synthesis (v3.24s), page 91</a:t>
             </a:r>
             <a:endParaRPr lang="en-US" sz="1400" dirty="0">
               <a:solidFill>
@@ -14592,11 +14827,7 @@
           <a:p>
             <a:r>
               <a:rPr lang="en-US" dirty="0" smtClean="0"/>
-              <a:t>Time-varying </a:t>
-            </a:r>
-            <a:r>
-              <a:rPr lang="en-US" dirty="0" smtClean="0"/>
-              <a:t>growth: cohort-specific effects</a:t>
+              <a:t>Time-varying growth: cohort-specific effects</a:t>
             </a:r>
             <a:endParaRPr lang="en-US" dirty="0"/>
           </a:p>
@@ -14624,13 +14855,8 @@
           <a:p>
             <a:r>
               <a:rPr lang="en-US" dirty="0" smtClean="0"/>
-              <a:t>Ask Athol </a:t>
-            </a:r>
-            <a:r>
-              <a:rPr lang="en-US" dirty="0" smtClean="0"/>
-              <a:t>Whitten</a:t>
-            </a:r>
-            <a:endParaRPr lang="en-US" dirty="0" smtClean="0"/>
+              <a:t>Ask Athol Whitten</a:t>
+            </a:r>
           </a:p>
           <a:p>
             <a:r>
@@ -15037,27 +15263,7 @@
                   </a:schemeClr>
                 </a:solidFill>
               </a:rPr>
-              <a:t>source:  </a:t>
-            </a:r>
-            <a:r>
-              <a:rPr lang="en-US" sz="1400" dirty="0" smtClean="0">
-                <a:solidFill>
-                  <a:schemeClr val="accent1">
-                    <a:lumMod val="75000"/>
-                  </a:schemeClr>
-                </a:solidFill>
-              </a:rPr>
-              <a:t>Taylor and Methot </a:t>
-            </a:r>
-            <a:r>
-              <a:rPr lang="en-US" sz="1400" dirty="0" smtClean="0">
-                <a:solidFill>
-                  <a:schemeClr val="accent1">
-                    <a:lumMod val="75000"/>
-                  </a:schemeClr>
-                </a:solidFill>
-              </a:rPr>
-              <a:t>(2013)</a:t>
+              <a:t>source:  Taylor and Methot (2013)</a:t>
             </a:r>
             <a:endParaRPr lang="en-US" sz="1400" dirty="0">
               <a:solidFill>
@@ -15229,27 +15435,7 @@
                   </a:schemeClr>
                 </a:solidFill>
               </a:rPr>
-              <a:t>source:  </a:t>
-            </a:r>
-            <a:r>
-              <a:rPr lang="en-US" sz="1400" dirty="0" smtClean="0">
-                <a:solidFill>
-                  <a:schemeClr val="accent1">
-                    <a:lumMod val="75000"/>
-                  </a:schemeClr>
-                </a:solidFill>
-              </a:rPr>
-              <a:t>Taylor and Methot </a:t>
-            </a:r>
-            <a:r>
-              <a:rPr lang="en-US" sz="1400" dirty="0" smtClean="0">
-                <a:solidFill>
-                  <a:schemeClr val="accent1">
-                    <a:lumMod val="75000"/>
-                  </a:schemeClr>
-                </a:solidFill>
-              </a:rPr>
-              <a:t>(2013)</a:t>
+              <a:t>source:  Taylor and Methot (2013)</a:t>
             </a:r>
             <a:endParaRPr lang="en-US" sz="1400" dirty="0">
               <a:solidFill>

</xml_diff>

<commit_message>
update github link and r4ss status in powerpoint file
</commit_message>
<xml_diff>
--- a/Modeling growth in SS.pptx
+++ b/Modeling growth in SS.pptx
@@ -155,6 +155,22 @@
       </a:defRPr>
     </a:lvl9pPr>
   </p:defaultTextStyle>
+  <p:extLst>
+    <p:ext uri="{EFAFB233-063F-42B5-8137-9DF3F51BA10A}">
+      <p15:sldGuideLst xmlns:p15="http://schemas.microsoft.com/office/powerpoint/2012/main">
+        <p15:guide id="1" orient="horz" pos="2160">
+          <p15:clr>
+            <a:srgbClr val="A4A3A4"/>
+          </p15:clr>
+        </p15:guide>
+        <p15:guide id="2" pos="2880">
+          <p15:clr>
+            <a:srgbClr val="A4A3A4"/>
+          </p15:clr>
+        </p15:guide>
+      </p15:sldGuideLst>
+    </p:ext>
+  </p:extLst>
 </p:presentation>
 </file>
 
@@ -240,7 +256,7 @@
           <a:p>
             <a:fld id="{8BDEA320-D87F-432B-A2D1-C1DBBD67F1B8}" type="datetimeFigureOut">
               <a:rPr lang="en-US" smtClean="0"/>
-              <a:t>11/3/2014</a:t>
+              <a:t>8/7/2020</a:t>
             </a:fld>
             <a:endParaRPr lang="en-US"/>
           </a:p>
@@ -689,7 +705,7 @@
           <a:p>
             <a:fld id="{92150618-2D8B-4671-A7E9-4F507CC8D3CA}" type="datetime1">
               <a:rPr lang="en-US" smtClean="0"/>
-              <a:t>11/3/2014</a:t>
+              <a:t>8/7/2020</a:t>
             </a:fld>
             <a:endParaRPr lang="en-US"/>
           </a:p>
@@ -859,7 +875,7 @@
           <a:p>
             <a:fld id="{38296B28-C2BB-4D3A-80A9-B0FD0FFD3639}" type="datetime1">
               <a:rPr lang="en-US" smtClean="0"/>
-              <a:t>11/3/2014</a:t>
+              <a:t>8/7/2020</a:t>
             </a:fld>
             <a:endParaRPr lang="en-US"/>
           </a:p>
@@ -1039,7 +1055,7 @@
           <a:p>
             <a:fld id="{E8D4E16A-F7A5-41FE-8BAA-D978E21E86F7}" type="datetime1">
               <a:rPr lang="en-US" smtClean="0"/>
-              <a:t>11/3/2014</a:t>
+              <a:t>8/7/2020</a:t>
             </a:fld>
             <a:endParaRPr lang="en-US"/>
           </a:p>
@@ -1225,7 +1241,7 @@
           <a:p>
             <a:fld id="{D1BABCAE-95FB-422C-B326-997C14732206}" type="datetime1">
               <a:rPr lang="en-US" smtClean="0"/>
-              <a:t>11/3/2014</a:t>
+              <a:t>8/7/2020</a:t>
             </a:fld>
             <a:endParaRPr lang="en-US"/>
           </a:p>
@@ -1471,7 +1487,7 @@
           <a:p>
             <a:fld id="{ED264FE7-BF52-42DB-A320-CBCFCD3CC148}" type="datetime1">
               <a:rPr lang="en-US" smtClean="0"/>
-              <a:t>11/3/2014</a:t>
+              <a:t>8/7/2020</a:t>
             </a:fld>
             <a:endParaRPr lang="en-US"/>
           </a:p>
@@ -1759,7 +1775,7 @@
           <a:p>
             <a:fld id="{D73B1584-35F3-4293-8119-4987668DD9A8}" type="datetime1">
               <a:rPr lang="en-US" smtClean="0"/>
-              <a:t>11/3/2014</a:t>
+              <a:t>8/7/2020</a:t>
             </a:fld>
             <a:endParaRPr lang="en-US"/>
           </a:p>
@@ -2181,7 +2197,7 @@
           <a:p>
             <a:fld id="{45119E7C-631D-4FC7-B81C-FAE10B94F2DC}" type="datetime1">
               <a:rPr lang="en-US" smtClean="0"/>
-              <a:t>11/3/2014</a:t>
+              <a:t>8/7/2020</a:t>
             </a:fld>
             <a:endParaRPr lang="en-US"/>
           </a:p>
@@ -2299,7 +2315,7 @@
           <a:p>
             <a:fld id="{97E863B6-9611-45AC-BDB5-7B41A29B8371}" type="datetime1">
               <a:rPr lang="en-US" smtClean="0"/>
-              <a:t>11/3/2014</a:t>
+              <a:t>8/7/2020</a:t>
             </a:fld>
             <a:endParaRPr lang="en-US"/>
           </a:p>
@@ -2394,7 +2410,7 @@
           <a:p>
             <a:fld id="{31099C80-CEC6-4DE7-B7F8-04317AADBEE3}" type="datetime1">
               <a:rPr lang="en-US" smtClean="0"/>
-              <a:t>11/3/2014</a:t>
+              <a:t>8/7/2020</a:t>
             </a:fld>
             <a:endParaRPr lang="en-US"/>
           </a:p>
@@ -2671,7 +2687,7 @@
           <a:p>
             <a:fld id="{51C37418-E6A9-4C61-95F0-EE7105F56D5A}" type="datetime1">
               <a:rPr lang="en-US" smtClean="0"/>
-              <a:t>11/3/2014</a:t>
+              <a:t>8/7/2020</a:t>
             </a:fld>
             <a:endParaRPr lang="en-US"/>
           </a:p>
@@ -2924,7 +2940,7 @@
           <a:p>
             <a:fld id="{61FC5CA3-2DB4-48E1-90DE-A6D1629D01CA}" type="datetime1">
               <a:rPr lang="en-US" smtClean="0"/>
-              <a:t>11/3/2014</a:t>
+              <a:t>8/7/2020</a:t>
             </a:fld>
             <a:endParaRPr lang="en-US"/>
           </a:p>
@@ -3137,7 +3153,7 @@
           <a:p>
             <a:fld id="{37149E33-9BA2-46DD-AAF9-2B70C92015D7}" type="datetime1">
               <a:rPr lang="en-US" smtClean="0"/>
-              <a:t>11/3/2014</a:t>
+              <a:t>8/7/2020</a:t>
             </a:fld>
             <a:endParaRPr lang="en-US"/>
           </a:p>
@@ -3633,6 +3649,48 @@
           </a:p>
         </p:txBody>
       </p:sp>
+      <p:sp>
+        <p:nvSpPr>
+          <p:cNvPr id="4" name="TextBox 3"/>
+          <p:cNvSpPr txBox="1"/>
+          <p:nvPr/>
+        </p:nvSpPr>
+        <p:spPr>
+          <a:xfrm>
+            <a:off x="976624" y="5715000"/>
+            <a:ext cx="7190751" cy="369332"/>
+          </a:xfrm>
+          <a:prstGeom prst="rect">
+            <a:avLst/>
+          </a:prstGeom>
+          <a:noFill/>
+        </p:spPr>
+        <p:txBody>
+          <a:bodyPr wrap="none" rtlCol="0">
+            <a:spAutoFit/>
+          </a:bodyPr>
+          <a:lstStyle/>
+          <a:p>
+            <a:r>
+              <a:rPr lang="en-US" i="1" dirty="0" smtClean="0">
+                <a:solidFill>
+                  <a:schemeClr val="bg1">
+                    <a:lumMod val="50000"/>
+                  </a:schemeClr>
+                </a:solidFill>
+              </a:rPr>
+              <a:t>Updated 7 August 2020 to reflect change in GitHub link and r4ss install info</a:t>
+            </a:r>
+            <a:endParaRPr lang="en-US" i="1" dirty="0">
+              <a:solidFill>
+                <a:schemeClr val="bg1">
+                  <a:lumMod val="50000"/>
+                </a:schemeClr>
+              </a:solidFill>
+            </a:endParaRPr>
+          </a:p>
+        </p:txBody>
+      </p:sp>
     </p:spTree>
     <p:extLst>
       <p:ext uri="{BB962C8B-B14F-4D97-AF65-F5344CB8AC3E}">
@@ -6779,7 +6837,6 @@
               <a:rPr lang="en-US" dirty="0" smtClean="0"/>
               <a:t>Apply selectivity at length</a:t>
             </a:r>
-            <a:endParaRPr lang="en-US" dirty="0" smtClean="0"/>
           </a:p>
           <a:p>
             <a:r>
@@ -7079,13 +7136,6 @@
               </a:rPr>
               <a:t>Methot_Wetzel_2013_Appendix.pdf</a:t>
             </a:r>
-            <a:endParaRPr lang="en-US" sz="1400" dirty="0">
-              <a:solidFill>
-                <a:schemeClr val="accent1">
-                  <a:lumMod val="75000"/>
-                </a:schemeClr>
-              </a:solidFill>
-            </a:endParaRPr>
           </a:p>
         </p:txBody>
       </p:sp>
@@ -7644,7 +7694,6 @@
               <a:rPr lang="en-US" dirty="0" smtClean="0"/>
               <a:t>Apply selectivity at age or length</a:t>
             </a:r>
-            <a:endParaRPr lang="en-US" dirty="0" smtClean="0"/>
           </a:p>
           <a:p>
             <a:r>
@@ -7997,7 +8046,6 @@
               <a:rPr lang="en-US" dirty="0" smtClean="0"/>
               <a:t>Apply ageing error</a:t>
             </a:r>
-            <a:endParaRPr lang="en-US" dirty="0" smtClean="0"/>
           </a:p>
           <a:p>
             <a:r>
@@ -8010,13 +8058,6 @@
               </a:rPr>
               <a:t>“AGE_AGE_KEY”</a:t>
             </a:r>
-            <a:endParaRPr lang="en-US" dirty="0">
-              <a:solidFill>
-                <a:schemeClr val="accent6">
-                  <a:lumMod val="50000"/>
-                </a:schemeClr>
-              </a:solidFill>
-            </a:endParaRPr>
           </a:p>
           <a:p>
             <a:r>
@@ -8121,11 +8162,7 @@
           <a:p>
             <a:r>
               <a:rPr lang="en-US" dirty="0" smtClean="0"/>
-              <a:t>Get comps by a</a:t>
-            </a:r>
-            <a:r>
-              <a:rPr lang="en-US" dirty="0" smtClean="0"/>
-              <a:t>ggregating </a:t>
+              <a:t>Get comps by aggregating </a:t>
             </a:r>
           </a:p>
           <a:p>
@@ -8154,7 +8191,6 @@
               <a:rPr lang="en-US" dirty="0" smtClean="0"/>
               <a:t>on length</a:t>
             </a:r>
-            <a:endParaRPr lang="en-US" dirty="0" smtClean="0"/>
           </a:p>
         </p:txBody>
       </p:sp>
@@ -8242,7 +8278,6 @@
               <a:rPr lang="en-US" dirty="0" smtClean="0"/>
               <a:t>Apply maturity at age or length</a:t>
             </a:r>
-            <a:endParaRPr lang="en-US" dirty="0" smtClean="0"/>
           </a:p>
           <a:p>
             <a:r>
@@ -8407,7 +8442,6 @@
               <a:rPr lang="en-US" dirty="0" smtClean="0"/>
               <a:t>Get spawning biomass by aggregating over everything</a:t>
             </a:r>
-            <a:endParaRPr lang="en-US" dirty="0" smtClean="0"/>
           </a:p>
         </p:txBody>
       </p:sp>
@@ -8563,7 +8597,6 @@
               <a:rPr lang="en-US" sz="4000" dirty="0" smtClean="0"/>
               <a:t>Whatever you want to talk about</a:t>
             </a:r>
-            <a:endParaRPr lang="en-US" sz="4000" dirty="0" smtClean="0"/>
           </a:p>
         </p:txBody>
       </p:sp>
@@ -11943,7 +11976,7 @@
         </p:spPr>
         <p:txBody>
           <a:bodyPr>
-            <a:normAutofit lnSpcReduction="10000"/>
+            <a:normAutofit/>
           </a:bodyPr>
           <a:lstStyle/>
           <a:p>
@@ -11955,11 +11988,7 @@
           <a:p>
             <a:r>
               <a:rPr lang="en-US" dirty="0" smtClean="0"/>
-              <a:t>More </a:t>
-            </a:r>
-            <a:r>
-              <a:rPr lang="en-US" dirty="0" smtClean="0"/>
-              <a:t>SS materials at this </a:t>
+              <a:t>More SS materials at this </a:t>
             </a:r>
             <a:r>
               <a:rPr lang="en-US" dirty="0" smtClean="0">
@@ -11981,7 +12010,13 @@
               <a:rPr lang="en-US" dirty="0" smtClean="0">
                 <a:hlinkClick r:id="rId3"/>
               </a:rPr>
-              <a:t>https://github.com/taylori/SSgrowth</a:t>
+              <a:t>https://</a:t>
+            </a:r>
+            <a:r>
+              <a:rPr lang="en-US" dirty="0">
+                <a:hlinkClick r:id="rId3"/>
+              </a:rPr>
+              <a:t>github.com/iantaylor-NOAA/SSgrowth</a:t>
             </a:r>
             <a:endParaRPr lang="en-US" dirty="0" smtClean="0"/>
           </a:p>
@@ -11989,21 +12024,6 @@
             <a:r>
               <a:rPr lang="en-US" dirty="0" smtClean="0"/>
               <a:t>Figures created using r4ss package</a:t>
-            </a:r>
-          </a:p>
-          <a:p>
-            <a:pPr lvl="1"/>
-            <a:r>
-              <a:rPr lang="en-US" dirty="0" smtClean="0"/>
-              <a:t>Still in development, currently requires branch available via the “</a:t>
-            </a:r>
-            <a:r>
-              <a:rPr lang="en-US" dirty="0" err="1" smtClean="0"/>
-              <a:t>devtools</a:t>
-            </a:r>
-            <a:r>
-              <a:rPr lang="en-US" dirty="0" smtClean="0"/>
-              <a:t>” package from GitHub:</a:t>
             </a:r>
           </a:p>
           <a:p>
@@ -12015,48 +12035,28 @@
                 <a:latin typeface="Courier New" panose="02070309020205020404" pitchFamily="49" charset="0"/>
                 <a:cs typeface="Courier New" panose="02070309020205020404" pitchFamily="49" charset="0"/>
               </a:rPr>
-              <a:t>&gt; </a:t>
+              <a:t>&gt; remotes::</a:t>
             </a:r>
             <a:r>
               <a:rPr lang="en-US" sz="2000" dirty="0" err="1" smtClean="0">
                 <a:latin typeface="Courier New" panose="02070309020205020404" pitchFamily="49" charset="0"/>
                 <a:cs typeface="Courier New" panose="02070309020205020404" pitchFamily="49" charset="0"/>
               </a:rPr>
-              <a:t>devtools</a:t>
+              <a:t>install_github</a:t>
             </a:r>
             <a:r>
               <a:rPr lang="en-US" sz="2000" dirty="0" smtClean="0">
                 <a:latin typeface="Courier New" panose="02070309020205020404" pitchFamily="49" charset="0"/>
                 <a:cs typeface="Courier New" panose="02070309020205020404" pitchFamily="49" charset="0"/>
               </a:rPr>
-              <a:t>::</a:t>
-            </a:r>
-            <a:r>
-              <a:rPr lang="en-US" sz="2000" dirty="0" err="1" smtClean="0">
-                <a:latin typeface="Courier New" panose="02070309020205020404" pitchFamily="49" charset="0"/>
-                <a:cs typeface="Courier New" panose="02070309020205020404" pitchFamily="49" charset="0"/>
-              </a:rPr>
-              <a:t>install_github</a:t>
+              <a:t>(</a:t>
             </a:r>
             <a:r>
               <a:rPr lang="en-US" sz="2000" dirty="0" smtClean="0">
                 <a:latin typeface="Courier New" panose="02070309020205020404" pitchFamily="49" charset="0"/>
                 <a:cs typeface="Courier New" panose="02070309020205020404" pitchFamily="49" charset="0"/>
               </a:rPr>
-              <a:t>('r4ss/r4ss',             </a:t>
-            </a:r>
-            <a:br>
-              <a:rPr lang="en-US" sz="2000" dirty="0" smtClean="0">
-                <a:latin typeface="Courier New" panose="02070309020205020404" pitchFamily="49" charset="0"/>
-                <a:cs typeface="Courier New" panose="02070309020205020404" pitchFamily="49" charset="0"/>
-              </a:rPr>
-            </a:br>
-            <a:r>
-              <a:rPr lang="en-US" sz="2000" dirty="0" smtClean="0">
-                <a:latin typeface="Courier New" panose="02070309020205020404" pitchFamily="49" charset="0"/>
-                <a:cs typeface="Courier New" panose="02070309020205020404" pitchFamily="49" charset="0"/>
-              </a:rPr>
-              <a:t>                           ref='TA1.8testing')</a:t>
+              <a:t>'r4ss/r4ss')</a:t>
             </a:r>
             <a:endParaRPr lang="en-US" sz="3200" dirty="0" smtClean="0">
               <a:latin typeface="Courier New" panose="02070309020205020404" pitchFamily="49" charset="0"/>
@@ -15239,11 +15239,7 @@
           <a:p>
             <a:r>
               <a:rPr lang="en-US" dirty="0" smtClean="0"/>
-              <a:t>beginning </a:t>
-            </a:r>
-            <a:r>
-              <a:rPr lang="en-US" dirty="0" smtClean="0"/>
-              <a:t>of year vs. mid-year values</a:t>
+              <a:t>beginning of year vs. mid-year values</a:t>
             </a:r>
           </a:p>
           <a:p>
@@ -15253,11 +15249,7 @@
             </a:r>
             <a:r>
               <a:rPr lang="en-US" dirty="0" smtClean="0"/>
-              <a:t>easonal </a:t>
-            </a:r>
-            <a:r>
-              <a:rPr lang="en-US" dirty="0" smtClean="0"/>
-              <a:t>models</a:t>
+              <a:t>easonal models</a:t>
             </a:r>
           </a:p>
           <a:p>
@@ -15267,11 +15259,7 @@
             </a:r>
             <a:r>
               <a:rPr lang="en-US" dirty="0" smtClean="0"/>
-              <a:t>irth </a:t>
-            </a:r>
-            <a:r>
-              <a:rPr lang="en-US" dirty="0" smtClean="0"/>
-              <a:t>season</a:t>
+              <a:t>irth season</a:t>
             </a:r>
           </a:p>
           <a:p>
@@ -15281,11 +15269,7 @@
             </a:r>
             <a:r>
               <a:rPr lang="en-US" dirty="0" smtClean="0"/>
-              <a:t>leet </a:t>
-            </a:r>
-            <a:r>
-              <a:rPr lang="en-US" dirty="0" smtClean="0"/>
-              <a:t>timing </a:t>
+              <a:t>leet timing </a:t>
             </a:r>
             <a:br>
               <a:rPr lang="en-US" dirty="0" smtClean="0"/>
@@ -15305,8 +15289,21 @@
                   <a:srgbClr val="FF0000"/>
                 </a:solidFill>
               </a:rPr>
-              <a:t>All this is changing in SS version 3.3</a:t>
-            </a:r>
+              <a:t>All this is changing in SS version </a:t>
+            </a:r>
+            <a:r>
+              <a:rPr lang="en-US" i="1" dirty="0" smtClean="0">
+                <a:solidFill>
+                  <a:srgbClr val="FF0000"/>
+                </a:solidFill>
+              </a:rPr>
+              <a:t>3.30</a:t>
+            </a:r>
+            <a:endParaRPr lang="en-US" i="1" dirty="0" smtClean="0">
+              <a:solidFill>
+                <a:srgbClr val="FF0000"/>
+              </a:solidFill>
+            </a:endParaRPr>
           </a:p>
           <a:p>
             <a:r>
@@ -15315,11 +15312,7 @@
             </a:r>
             <a:r>
               <a:rPr lang="en-US" dirty="0" smtClean="0"/>
-              <a:t>bservations </a:t>
-            </a:r>
-            <a:r>
-              <a:rPr lang="en-US" dirty="0" smtClean="0"/>
-              <a:t>will be associated with month</a:t>
+              <a:t>bservations will be associated with month</a:t>
             </a:r>
           </a:p>
           <a:p>
@@ -15329,15 +15322,7 @@
             </a:r>
             <a:r>
               <a:rPr lang="en-US" dirty="0" smtClean="0"/>
-              <a:t>ettlement </a:t>
-            </a:r>
-            <a:r>
-              <a:rPr lang="en-US" dirty="0" smtClean="0"/>
-              <a:t>time replaces birth </a:t>
-            </a:r>
-            <a:r>
-              <a:rPr lang="en-US" dirty="0" smtClean="0"/>
-              <a:t>season</a:t>
+              <a:t>ettlement time replaces birth season</a:t>
             </a:r>
           </a:p>
           <a:p>
@@ -15345,7 +15330,6 @@
               <a:rPr lang="en-US" dirty="0" smtClean="0"/>
               <a:t>ask Rick Methot about the future</a:t>
             </a:r>
-            <a:endParaRPr lang="en-US" dirty="0" smtClean="0"/>
           </a:p>
           <a:p>
             <a:endParaRPr lang="en-US" dirty="0"/>
@@ -18136,17 +18120,7 @@
                   </a:schemeClr>
                 </a:solidFill>
               </a:rPr>
-              <a:t>source: </a:t>
-            </a:r>
-            <a:r>
-              <a:rPr lang="en-US" sz="1400" dirty="0" smtClean="0">
-                <a:solidFill>
-                  <a:schemeClr val="accent1">
-                    <a:lumMod val="75000"/>
-                  </a:schemeClr>
-                </a:solidFill>
-              </a:rPr>
-              <a:t>Methot_Wetzel_2013_Appendix.pdf (M&amp;W2013)</a:t>
+              <a:t>source: Methot_Wetzel_2013_Appendix.pdf (M&amp;W2013)</a:t>
             </a:r>
             <a:endParaRPr lang="en-US" sz="1400" dirty="0">
               <a:solidFill>
@@ -18798,15 +18772,7 @@
             </a:br>
             <a:r>
               <a:rPr lang="en-US" sz="2800" dirty="0" smtClean="0"/>
-              <a:t>2-parameter “dogleg” function </a:t>
-            </a:r>
-            <a:r>
-              <a:rPr lang="en-US" sz="2800" dirty="0" smtClean="0"/>
-              <a:t>(eq. A.1.13 in M&amp;W2013)</a:t>
-            </a:r>
-            <a:r>
-              <a:rPr lang="en-US" sz="2800" dirty="0" smtClean="0"/>
-              <a:t/>
+              <a:t>2-parameter “dogleg” function (eq. A.1.13 in M&amp;W2013)</a:t>
             </a:r>
             <a:br>
               <a:rPr lang="en-US" sz="2800" dirty="0" smtClean="0"/>

</xml_diff>